<commit_message>
new year - namebadge stuff, mainly.
</commit_message>
<xml_diff>
--- a/static/downloads/dem.pptx
+++ b/static/downloads/dem.pptx
@@ -7,32 +7,33 @@
   <p:sldIdLst>
     <p:sldId id="256" r:id="rId5"/>
     <p:sldId id="257" r:id="rId6"/>
-    <p:sldId id="310" r:id="rId7"/>
-    <p:sldId id="281" r:id="rId8"/>
-    <p:sldId id="282" r:id="rId9"/>
-    <p:sldId id="313" r:id="rId10"/>
-    <p:sldId id="283" r:id="rId11"/>
-    <p:sldId id="302" r:id="rId12"/>
-    <p:sldId id="303" r:id="rId13"/>
-    <p:sldId id="304" r:id="rId14"/>
-    <p:sldId id="305" r:id="rId15"/>
-    <p:sldId id="306" r:id="rId16"/>
-    <p:sldId id="308" r:id="rId17"/>
-    <p:sldId id="309" r:id="rId18"/>
-    <p:sldId id="312" r:id="rId19"/>
-    <p:sldId id="298" r:id="rId20"/>
+    <p:sldId id="316" r:id="rId7"/>
+    <p:sldId id="310" r:id="rId8"/>
+    <p:sldId id="281" r:id="rId9"/>
+    <p:sldId id="282" r:id="rId10"/>
+    <p:sldId id="313" r:id="rId11"/>
+    <p:sldId id="283" r:id="rId12"/>
+    <p:sldId id="302" r:id="rId13"/>
+    <p:sldId id="303" r:id="rId14"/>
+    <p:sldId id="304" r:id="rId15"/>
+    <p:sldId id="305" r:id="rId16"/>
+    <p:sldId id="306" r:id="rId17"/>
+    <p:sldId id="308" r:id="rId18"/>
+    <p:sldId id="309" r:id="rId19"/>
+    <p:sldId id="312" r:id="rId20"/>
     <p:sldId id="284" r:id="rId21"/>
-    <p:sldId id="288" r:id="rId22"/>
-    <p:sldId id="299" r:id="rId23"/>
-    <p:sldId id="285" r:id="rId24"/>
-    <p:sldId id="300" r:id="rId25"/>
-    <p:sldId id="314" r:id="rId26"/>
-    <p:sldId id="286" r:id="rId27"/>
+    <p:sldId id="315" r:id="rId22"/>
+    <p:sldId id="288" r:id="rId23"/>
+    <p:sldId id="299" r:id="rId24"/>
+    <p:sldId id="285" r:id="rId25"/>
+    <p:sldId id="300" r:id="rId26"/>
+    <p:sldId id="314" r:id="rId27"/>
+    <p:sldId id="286" r:id="rId28"/>
   </p:sldIdLst>
   <p:sldSz cx="9144000" cy="6858000" type="screen4x3"/>
   <p:notesSz cx="6797675" cy="9926638"/>
   <p:custDataLst>
-    <p:tags r:id="rId28"/>
+    <p:tags r:id="rId29"/>
   </p:custDataLst>
   <p:defaultTextStyle>
     <a:defPPr>
@@ -329,7 +330,7 @@
           <a:p>
             <a:fld id="{E6E61A80-AD3E-5043-BBBB-DD0D35B177C1}" type="datetimeFigureOut">
               <a:rPr lang="en-US" smtClean="0"/>
-              <a:t>10/12/2022</a:t>
+              <a:t>10/3/2023</a:t>
             </a:fld>
             <a:endParaRPr lang="en-US"/>
           </a:p>
@@ -494,7 +495,7 @@
           <a:p>
             <a:fld id="{E6E61A80-AD3E-5043-BBBB-DD0D35B177C1}" type="datetimeFigureOut">
               <a:rPr lang="en-US" smtClean="0"/>
-              <a:t>10/12/2022</a:t>
+              <a:t>10/3/2023</a:t>
             </a:fld>
             <a:endParaRPr lang="en-US"/>
           </a:p>
@@ -669,7 +670,7 @@
           <a:p>
             <a:fld id="{E6E61A80-AD3E-5043-BBBB-DD0D35B177C1}" type="datetimeFigureOut">
               <a:rPr lang="en-US" smtClean="0"/>
-              <a:t>10/12/2022</a:t>
+              <a:t>10/3/2023</a:t>
             </a:fld>
             <a:endParaRPr lang="en-US"/>
           </a:p>
@@ -834,7 +835,7 @@
           <a:p>
             <a:fld id="{E6E61A80-AD3E-5043-BBBB-DD0D35B177C1}" type="datetimeFigureOut">
               <a:rPr lang="en-US" smtClean="0"/>
-              <a:t>10/12/2022</a:t>
+              <a:t>10/3/2023</a:t>
             </a:fld>
             <a:endParaRPr lang="en-US"/>
           </a:p>
@@ -1075,7 +1076,7 @@
           <a:p>
             <a:fld id="{E6E61A80-AD3E-5043-BBBB-DD0D35B177C1}" type="datetimeFigureOut">
               <a:rPr lang="en-US" smtClean="0"/>
-              <a:t>10/12/2022</a:t>
+              <a:t>10/3/2023</a:t>
             </a:fld>
             <a:endParaRPr lang="en-US"/>
           </a:p>
@@ -1358,7 +1359,7 @@
           <a:p>
             <a:fld id="{E6E61A80-AD3E-5043-BBBB-DD0D35B177C1}" type="datetimeFigureOut">
               <a:rPr lang="en-US" smtClean="0"/>
-              <a:t>10/12/2022</a:t>
+              <a:t>10/3/2023</a:t>
             </a:fld>
             <a:endParaRPr lang="en-US"/>
           </a:p>
@@ -1775,7 +1776,7 @@
           <a:p>
             <a:fld id="{E6E61A80-AD3E-5043-BBBB-DD0D35B177C1}" type="datetimeFigureOut">
               <a:rPr lang="en-US" smtClean="0"/>
-              <a:t>10/12/2022</a:t>
+              <a:t>10/3/2023</a:t>
             </a:fld>
             <a:endParaRPr lang="en-US"/>
           </a:p>
@@ -1888,7 +1889,7 @@
           <a:p>
             <a:fld id="{E6E61A80-AD3E-5043-BBBB-DD0D35B177C1}" type="datetimeFigureOut">
               <a:rPr lang="en-US" smtClean="0"/>
-              <a:t>10/12/2022</a:t>
+              <a:t>10/3/2023</a:t>
             </a:fld>
             <a:endParaRPr lang="en-US"/>
           </a:p>
@@ -1978,7 +1979,7 @@
           <a:p>
             <a:fld id="{E6E61A80-AD3E-5043-BBBB-DD0D35B177C1}" type="datetimeFigureOut">
               <a:rPr lang="en-US" smtClean="0"/>
-              <a:t>10/12/2022</a:t>
+              <a:t>10/3/2023</a:t>
             </a:fld>
             <a:endParaRPr lang="en-US"/>
           </a:p>
@@ -2250,7 +2251,7 @@
           <a:p>
             <a:fld id="{E6E61A80-AD3E-5043-BBBB-DD0D35B177C1}" type="datetimeFigureOut">
               <a:rPr lang="en-US" smtClean="0"/>
-              <a:t>10/12/2022</a:t>
+              <a:t>10/3/2023</a:t>
             </a:fld>
             <a:endParaRPr lang="en-US"/>
           </a:p>
@@ -2498,7 +2499,7 @@
           <a:p>
             <a:fld id="{E6E61A80-AD3E-5043-BBBB-DD0D35B177C1}" type="datetimeFigureOut">
               <a:rPr lang="en-US" smtClean="0"/>
-              <a:t>10/12/2022</a:t>
+              <a:t>10/3/2023</a:t>
             </a:fld>
             <a:endParaRPr lang="en-US"/>
           </a:p>
@@ -2706,7 +2707,7 @@
           <a:p>
             <a:fld id="{E6E61A80-AD3E-5043-BBBB-DD0D35B177C1}" type="datetimeFigureOut">
               <a:rPr lang="en-US" smtClean="0"/>
-              <a:t>10/12/2022</a:t>
+              <a:t>10/3/2023</a:t>
             </a:fld>
             <a:endParaRPr lang="en-US"/>
           </a:p>
@@ -3129,7 +3130,7 @@
             <a:pPr algn="ctr"/>
             <a:r>
               <a:rPr lang="en-GB" sz="3600" b="1" dirty="0"/>
-              <a:t>October 2022</a:t>
+              <a:t>October 2023</a:t>
             </a:r>
           </a:p>
           <a:p>
@@ -3235,10 +3236,10 @@
       </p:sp>
       <p:pic>
         <p:nvPicPr>
-          <p:cNvPr id="6" name="Content Placeholder 5">
+          <p:cNvPr id="4" name="Content Placeholder 3">
             <a:extLst>
               <a:ext uri="{FF2B5EF4-FFF2-40B4-BE49-F238E27FC236}">
-                <a16:creationId xmlns:a16="http://schemas.microsoft.com/office/drawing/2014/main" id="{FAFE6A30-7CBE-44E0-BB9F-EFCC1D52EB2E}"/>
+                <a16:creationId xmlns:a16="http://schemas.microsoft.com/office/drawing/2014/main" id="{134F007C-F9BF-4103-9AAE-57E804EFECFA}"/>
               </a:ext>
             </a:extLst>
           </p:cNvPr>
@@ -3257,8 +3258,8 @@
         </p:blipFill>
         <p:spPr>
           <a:xfrm>
-            <a:off x="488424" y="1600200"/>
-            <a:ext cx="8167151" cy="4525963"/>
+            <a:off x="457200" y="1634331"/>
+            <a:ext cx="8229600" cy="4457700"/>
           </a:xfrm>
           <a:prstGeom prst="rect">
             <a:avLst/>
@@ -3268,7 +3269,7 @@
     </p:spTree>
     <p:extLst>
       <p:ext uri="{BB962C8B-B14F-4D97-AF65-F5344CB8AC3E}">
-        <p14:creationId xmlns:p14="http://schemas.microsoft.com/office/powerpoint/2010/main" val="1259174857"/>
+        <p14:creationId xmlns:p14="http://schemas.microsoft.com/office/powerpoint/2010/main" val="3892910494"/>
       </p:ext>
     </p:extLst>
   </p:cSld>
@@ -3343,10 +3344,10 @@
       </p:sp>
       <p:pic>
         <p:nvPicPr>
-          <p:cNvPr id="7" name="Content Placeholder 6">
+          <p:cNvPr id="6" name="Content Placeholder 5">
             <a:extLst>
               <a:ext uri="{FF2B5EF4-FFF2-40B4-BE49-F238E27FC236}">
-                <a16:creationId xmlns:a16="http://schemas.microsoft.com/office/drawing/2014/main" id="{62E94EB5-BFD8-4D7C-8D56-B1C997FCD95C}"/>
+                <a16:creationId xmlns:a16="http://schemas.microsoft.com/office/drawing/2014/main" id="{FAFE6A30-7CBE-44E0-BB9F-EFCC1D52EB2E}"/>
               </a:ext>
             </a:extLst>
           </p:cNvPr>
@@ -3365,8 +3366,8 @@
         </p:blipFill>
         <p:spPr>
           <a:xfrm>
-            <a:off x="457200" y="1634331"/>
-            <a:ext cx="8229600" cy="4457700"/>
+            <a:off x="488424" y="1600200"/>
+            <a:ext cx="8167151" cy="4525963"/>
           </a:xfrm>
           <a:prstGeom prst="rect">
             <a:avLst/>
@@ -3376,7 +3377,7 @@
     </p:spTree>
     <p:extLst>
       <p:ext uri="{BB962C8B-B14F-4D97-AF65-F5344CB8AC3E}">
-        <p14:creationId xmlns:p14="http://schemas.microsoft.com/office/powerpoint/2010/main" val="2681206956"/>
+        <p14:creationId xmlns:p14="http://schemas.microsoft.com/office/powerpoint/2010/main" val="1259174857"/>
       </p:ext>
     </p:extLst>
   </p:cSld>
@@ -3451,10 +3452,10 @@
       </p:sp>
       <p:pic>
         <p:nvPicPr>
-          <p:cNvPr id="8" name="Content Placeholder 7">
+          <p:cNvPr id="7" name="Content Placeholder 6">
             <a:extLst>
               <a:ext uri="{FF2B5EF4-FFF2-40B4-BE49-F238E27FC236}">
-                <a16:creationId xmlns:a16="http://schemas.microsoft.com/office/drawing/2014/main" id="{A652DB6C-0494-4DB4-8612-57AEA162DD6D}"/>
+                <a16:creationId xmlns:a16="http://schemas.microsoft.com/office/drawing/2014/main" id="{62E94EB5-BFD8-4D7C-8D56-B1C997FCD95C}"/>
               </a:ext>
             </a:extLst>
           </p:cNvPr>
@@ -3484,7 +3485,7 @@
     </p:spTree>
     <p:extLst>
       <p:ext uri="{BB962C8B-B14F-4D97-AF65-F5344CB8AC3E}">
-        <p14:creationId xmlns:p14="http://schemas.microsoft.com/office/powerpoint/2010/main" val="3772685921"/>
+        <p14:creationId xmlns:p14="http://schemas.microsoft.com/office/powerpoint/2010/main" val="2681206956"/>
       </p:ext>
     </p:extLst>
   </p:cSld>
@@ -3559,10 +3560,10 @@
       </p:sp>
       <p:pic>
         <p:nvPicPr>
-          <p:cNvPr id="5" name="Content Placeholder 4">
+          <p:cNvPr id="8" name="Content Placeholder 7">
             <a:extLst>
               <a:ext uri="{FF2B5EF4-FFF2-40B4-BE49-F238E27FC236}">
-                <a16:creationId xmlns:a16="http://schemas.microsoft.com/office/drawing/2014/main" id="{8E68A008-70C3-4B82-AEE4-9595A15B118D}"/>
+                <a16:creationId xmlns:a16="http://schemas.microsoft.com/office/drawing/2014/main" id="{A652DB6C-0494-4DB4-8612-57AEA162DD6D}"/>
               </a:ext>
             </a:extLst>
           </p:cNvPr>
@@ -3592,7 +3593,7 @@
     </p:spTree>
     <p:extLst>
       <p:ext uri="{BB962C8B-B14F-4D97-AF65-F5344CB8AC3E}">
-        <p14:creationId xmlns:p14="http://schemas.microsoft.com/office/powerpoint/2010/main" val="2985795587"/>
+        <p14:creationId xmlns:p14="http://schemas.microsoft.com/office/powerpoint/2010/main" val="3772685921"/>
       </p:ext>
     </p:extLst>
   </p:cSld>
@@ -3667,10 +3668,10 @@
       </p:sp>
       <p:pic>
         <p:nvPicPr>
-          <p:cNvPr id="6" name="Content Placeholder 5">
+          <p:cNvPr id="5" name="Content Placeholder 4">
             <a:extLst>
               <a:ext uri="{FF2B5EF4-FFF2-40B4-BE49-F238E27FC236}">
-                <a16:creationId xmlns:a16="http://schemas.microsoft.com/office/drawing/2014/main" id="{CB08D1CC-B734-422D-BC06-781827436997}"/>
+                <a16:creationId xmlns:a16="http://schemas.microsoft.com/office/drawing/2014/main" id="{8E68A008-70C3-4B82-AEE4-9595A15B118D}"/>
               </a:ext>
             </a:extLst>
           </p:cNvPr>
@@ -3700,7 +3701,7 @@
     </p:spTree>
     <p:extLst>
       <p:ext uri="{BB962C8B-B14F-4D97-AF65-F5344CB8AC3E}">
-        <p14:creationId xmlns:p14="http://schemas.microsoft.com/office/powerpoint/2010/main" val="1927742201"/>
+        <p14:creationId xmlns:p14="http://schemas.microsoft.com/office/powerpoint/2010/main" val="2985795587"/>
       </p:ext>
     </p:extLst>
   </p:cSld>
@@ -3768,17 +3769,17 @@
             </a:br>
             <a:r>
               <a:rPr lang="en-GB" b="1" dirty="0"/>
-              <a:t>Queuing system</a:t>
+              <a:t>Worksheet signoff system</a:t>
             </a:r>
           </a:p>
         </p:txBody>
       </p:sp>
       <p:pic>
         <p:nvPicPr>
-          <p:cNvPr id="7" name="Content Placeholder 6">
+          <p:cNvPr id="6" name="Content Placeholder 5">
             <a:extLst>
               <a:ext uri="{FF2B5EF4-FFF2-40B4-BE49-F238E27FC236}">
-                <a16:creationId xmlns:a16="http://schemas.microsoft.com/office/drawing/2014/main" id="{671706E8-1841-463E-B61D-6AC24B5D6624}"/>
+                <a16:creationId xmlns:a16="http://schemas.microsoft.com/office/drawing/2014/main" id="{CB08D1CC-B734-422D-BC06-781827436997}"/>
               </a:ext>
             </a:extLst>
           </p:cNvPr>
@@ -3805,45 +3806,10 @@
           </a:prstGeom>
         </p:spPr>
       </p:pic>
-      <p:sp>
-        <p:nvSpPr>
-          <p:cNvPr id="8" name="TextBox 7">
-            <a:extLst>
-              <a:ext uri="{FF2B5EF4-FFF2-40B4-BE49-F238E27FC236}">
-                <a16:creationId xmlns:a16="http://schemas.microsoft.com/office/drawing/2014/main" id="{8B67FBC2-E58A-4B82-803A-9ABE947E2180}"/>
-              </a:ext>
-            </a:extLst>
-          </p:cNvPr>
-          <p:cNvSpPr txBox="1"/>
-          <p:nvPr/>
-        </p:nvSpPr>
-        <p:spPr>
-          <a:xfrm>
-            <a:off x="3779912" y="4626637"/>
-            <a:ext cx="3384376" cy="1477328"/>
-          </a:xfrm>
-          <a:prstGeom prst="rect">
-            <a:avLst/>
-          </a:prstGeom>
-          <a:noFill/>
-        </p:spPr>
-        <p:txBody>
-          <a:bodyPr wrap="square" rtlCol="0">
-            <a:spAutoFit/>
-          </a:bodyPr>
-          <a:lstStyle/>
-          <a:p>
-            <a:r>
-              <a:rPr lang="en-GB" dirty="0"/>
-              <a:t>This will only show a queue when you have a session running. Click on “New Student” to start helping a student. Computer numbers are stuck onto the computers.</a:t>
-            </a:r>
-          </a:p>
-        </p:txBody>
-      </p:sp>
     </p:spTree>
     <p:extLst>
       <p:ext uri="{BB962C8B-B14F-4D97-AF65-F5344CB8AC3E}">
-        <p14:creationId xmlns:p14="http://schemas.microsoft.com/office/powerpoint/2010/main" val="1105454625"/>
+        <p14:creationId xmlns:p14="http://schemas.microsoft.com/office/powerpoint/2010/main" val="1927742201"/>
       </p:ext>
     </p:extLst>
   </p:cSld>
@@ -3911,74 +3877,82 @@
             </a:br>
             <a:r>
               <a:rPr lang="en-GB" b="1" dirty="0"/>
-              <a:t>COVID-19 (Face to Face)</a:t>
-            </a:r>
-          </a:p>
-        </p:txBody>
-      </p:sp>
-      <p:sp>
-        <p:nvSpPr>
-          <p:cNvPr id="3" name="Content Placeholder 2"/>
-          <p:cNvSpPr>
-            <a:spLocks noGrp="1"/>
-          </p:cNvSpPr>
+              <a:t>Queuing system</a:t>
+            </a:r>
+          </a:p>
+        </p:txBody>
+      </p:sp>
+      <p:pic>
+        <p:nvPicPr>
+          <p:cNvPr id="7" name="Content Placeholder 6">
+            <a:extLst>
+              <a:ext uri="{FF2B5EF4-FFF2-40B4-BE49-F238E27FC236}">
+                <a16:creationId xmlns:a16="http://schemas.microsoft.com/office/drawing/2014/main" id="{671706E8-1841-463E-B61D-6AC24B5D6624}"/>
+              </a:ext>
+            </a:extLst>
+          </p:cNvPr>
+          <p:cNvPicPr>
+            <a:picLocks noGrp="1" noChangeAspect="1"/>
+          </p:cNvPicPr>
           <p:nvPr>
             <p:ph idx="1"/>
           </p:nvPr>
-        </p:nvSpPr>
-        <p:spPr/>
-        <p:txBody>
-          <a:bodyPr>
-            <a:normAutofit/>
+        </p:nvPicPr>
+        <p:blipFill>
+          <a:blip r:embed="rId3"/>
+          <a:stretch>
+            <a:fillRect/>
+          </a:stretch>
+        </p:blipFill>
+        <p:spPr>
+          <a:xfrm>
+            <a:off x="457200" y="1634331"/>
+            <a:ext cx="8229600" cy="4457700"/>
+          </a:xfrm>
+          <a:prstGeom prst="rect">
+            <a:avLst/>
+          </a:prstGeom>
+        </p:spPr>
+      </p:pic>
+      <p:sp>
+        <p:nvSpPr>
+          <p:cNvPr id="8" name="TextBox 7">
+            <a:extLst>
+              <a:ext uri="{FF2B5EF4-FFF2-40B4-BE49-F238E27FC236}">
+                <a16:creationId xmlns:a16="http://schemas.microsoft.com/office/drawing/2014/main" id="{8B67FBC2-E58A-4B82-803A-9ABE947E2180}"/>
+              </a:ext>
+            </a:extLst>
+          </p:cNvPr>
+          <p:cNvSpPr txBox="1"/>
+          <p:nvPr/>
+        </p:nvSpPr>
+        <p:spPr>
+          <a:xfrm>
+            <a:off x="3779912" y="4626637"/>
+            <a:ext cx="3384376" cy="1477328"/>
+          </a:xfrm>
+          <a:prstGeom prst="rect">
+            <a:avLst/>
+          </a:prstGeom>
+          <a:noFill/>
+        </p:spPr>
+        <p:txBody>
+          <a:bodyPr wrap="square" rtlCol="0">
+            <a:spAutoFit/>
           </a:bodyPr>
           <a:lstStyle/>
           <a:p>
             <a:r>
               <a:rPr lang="en-GB" dirty="0"/>
-              <a:t>If you are unwell, please </a:t>
-            </a:r>
-            <a:r>
-              <a:rPr lang="en-GB" b="1" dirty="0"/>
-              <a:t>let us know </a:t>
-            </a:r>
-            <a:r>
-              <a:rPr lang="en-GB" dirty="0"/>
-              <a:t>and </a:t>
-            </a:r>
-            <a:r>
-              <a:rPr lang="en-GB" b="1" dirty="0"/>
-              <a:t>don’t come in.</a:t>
-            </a:r>
-            <a:endParaRPr lang="en-GB" dirty="0"/>
-          </a:p>
-          <a:p>
-            <a:r>
-              <a:rPr lang="en-GB" dirty="0"/>
-              <a:t>You can approach students, but don’t touch their keyboards (good practice anyway!)</a:t>
-            </a:r>
-          </a:p>
-          <a:p>
-            <a:r>
-              <a:rPr lang="en-GB" dirty="0"/>
-              <a:t>And don’t get closer than 2m.</a:t>
-            </a:r>
-          </a:p>
-          <a:p>
-            <a:pPr lvl="0"/>
-            <a:endParaRPr lang="en-GB" dirty="0"/>
-          </a:p>
-          <a:p>
-            <a:pPr marL="0" indent="0">
-              <a:buNone/>
-            </a:pPr>
-            <a:endParaRPr lang="en-GB" dirty="0"/>
+              <a:t>This will only show a queue when you have a session running. Click on “New Student” to start helping a student. Computer numbers are stuck onto the computers.</a:t>
+            </a:r>
           </a:p>
         </p:txBody>
       </p:sp>
     </p:spTree>
     <p:extLst>
       <p:ext uri="{BB962C8B-B14F-4D97-AF65-F5344CB8AC3E}">
-        <p14:creationId xmlns:p14="http://schemas.microsoft.com/office/powerpoint/2010/main" val="2282558156"/>
+        <p14:creationId xmlns:p14="http://schemas.microsoft.com/office/powerpoint/2010/main" val="1105454625"/>
       </p:ext>
     </p:extLst>
   </p:cSld>
@@ -4046,7 +4020,7 @@
             </a:br>
             <a:r>
               <a:rPr lang="en-GB" b="1" dirty="0"/>
-              <a:t>Demonstrating</a:t>
+              <a:t>Name badges</a:t>
             </a:r>
           </a:p>
         </p:txBody>
@@ -4064,61 +4038,19 @@
         <p:spPr/>
         <p:txBody>
           <a:bodyPr>
-            <a:normAutofit fontScale="62500" lnSpcReduction="20000"/>
+            <a:normAutofit/>
           </a:bodyPr>
           <a:lstStyle/>
           <a:p>
             <a:r>
               <a:rPr lang="en-GB" sz="4000" dirty="0"/>
-              <a:t>Read the worksheet in advance!</a:t>
-            </a:r>
-          </a:p>
-          <a:p>
-            <a:r>
-              <a:rPr lang="en-GB" sz="4000" dirty="0"/>
-              <a:t>You don’t have to know everything, you can get help from the lecturer</a:t>
-            </a:r>
-          </a:p>
-          <a:p>
-            <a:r>
-              <a:rPr lang="en-GB" sz="4000" dirty="0"/>
-              <a:t>Help students to work out the solution a step at a time</a:t>
-            </a:r>
-          </a:p>
-          <a:p>
-            <a:r>
-              <a:rPr lang="en-GB" sz="4000" dirty="0"/>
-              <a:t>Ask them to describe the problem as precisely as they can</a:t>
-            </a:r>
-          </a:p>
-          <a:p>
-            <a:r>
-              <a:rPr lang="en-GB" sz="4000" dirty="0"/>
-              <a:t>Don’t do the work for them – easy to do that incrementally</a:t>
-            </a:r>
-          </a:p>
-          <a:p>
-            <a:r>
-              <a:rPr lang="en-GB" sz="4000" dirty="0"/>
-              <a:t>Needs to be their work, their way</a:t>
-            </a:r>
-          </a:p>
-          <a:p>
-            <a:r>
-              <a:rPr lang="en-GB" sz="4000" dirty="0"/>
-              <a:t>Be aware of plagiarism</a:t>
-            </a:r>
-          </a:p>
-          <a:p>
-            <a:r>
-              <a:rPr lang="en-GB" sz="4000" dirty="0"/>
-              <a:t>Try to be available to all students</a:t>
-            </a:r>
-          </a:p>
-          <a:p>
-            <a:r>
-              <a:rPr lang="en-GB" sz="4000" dirty="0"/>
-              <a:t>Be relaxed</a:t>
+              <a:t>You will get a name badge.</a:t>
+            </a:r>
+          </a:p>
+          <a:p>
+            <a:r>
+              <a:rPr lang="en-GB" sz="4000" u="sng" dirty="0"/>
+              <a:t>Wear your name badge.</a:t>
             </a:r>
           </a:p>
           <a:p>
@@ -4208,7 +4140,7 @@
             </a:br>
             <a:r>
               <a:rPr lang="en-GB" b="1" dirty="0"/>
-              <a:t>Kent (adj.)</a:t>
+              <a:t>Demonstrating</a:t>
             </a:r>
           </a:p>
         </p:txBody>
@@ -4226,63 +4158,83 @@
         <p:spPr/>
         <p:txBody>
           <a:bodyPr>
-            <a:normAutofit/>
+            <a:normAutofit fontScale="62500" lnSpcReduction="20000"/>
           </a:bodyPr>
           <a:lstStyle/>
           <a:p>
-            <a:pPr marL="0" lvl="0" indent="0">
-              <a:buNone/>
-            </a:pPr>
-            <a:r>
-              <a:rPr lang="en-GB" dirty="0"/>
-              <a:t>Politely determined not to help despite a violent urge to the contrary. </a:t>
-            </a:r>
-            <a:r>
-              <a:rPr lang="en-GB" i="1" dirty="0"/>
-              <a:t>Kent</a:t>
-            </a:r>
-            <a:r>
-              <a:rPr lang="en-GB" dirty="0"/>
-              <a:t> expressions are seen on the faces of people who are good at something watching someone else who can't do it at all.</a:t>
-            </a:r>
-          </a:p>
-          <a:p>
-            <a:pPr marL="0" lvl="0" indent="0">
+            <a:r>
+              <a:rPr lang="en-GB" sz="4000" dirty="0"/>
+              <a:t>Read the worksheet in advance!</a:t>
+            </a:r>
+          </a:p>
+          <a:p>
+            <a:r>
+              <a:rPr lang="en-GB" sz="4000" dirty="0"/>
+              <a:t>You don’t have to know everything, you can get help from the lecturer</a:t>
+            </a:r>
+          </a:p>
+          <a:p>
+            <a:r>
+              <a:rPr lang="en-GB" sz="4000" dirty="0"/>
+              <a:t>Help students to work out the solution a step at a time</a:t>
+            </a:r>
+          </a:p>
+          <a:p>
+            <a:r>
+              <a:rPr lang="en-GB" sz="4000" dirty="0"/>
+              <a:t>Ask them to describe the problem as precisely as they can</a:t>
+            </a:r>
+          </a:p>
+          <a:p>
+            <a:r>
+              <a:rPr lang="en-GB" sz="4000" dirty="0"/>
+              <a:t>Don’t do the work for them – easy to do that incrementally</a:t>
+            </a:r>
+          </a:p>
+          <a:p>
+            <a:r>
+              <a:rPr lang="en-GB" sz="4000" dirty="0"/>
+              <a:t>Needs to be their work, their way</a:t>
+            </a:r>
+          </a:p>
+          <a:p>
+            <a:r>
+              <a:rPr lang="en-GB" sz="4000" dirty="0"/>
+              <a:t>Be aware of plagiarism</a:t>
+            </a:r>
+          </a:p>
+          <a:p>
+            <a:r>
+              <a:rPr lang="en-GB" sz="4000" dirty="0"/>
+              <a:t>Try to be available to all students</a:t>
+            </a:r>
+          </a:p>
+          <a:p>
+            <a:r>
+              <a:rPr lang="en-GB" sz="4000" dirty="0"/>
+              <a:t>Be relaxed</a:t>
+            </a:r>
+          </a:p>
+          <a:p>
+            <a:pPr lvl="0"/>
+            <a:endParaRPr lang="en-GB" dirty="0"/>
+          </a:p>
+          <a:p>
+            <a:pPr lvl="0"/>
+            <a:endParaRPr lang="en-GB" dirty="0"/>
+          </a:p>
+          <a:p>
+            <a:pPr marL="0" indent="0">
               <a:buNone/>
             </a:pPr>
             <a:endParaRPr lang="en-GB" dirty="0"/>
-          </a:p>
-          <a:p>
-            <a:pPr marL="0" lvl="0" indent="0" algn="r">
-              <a:buNone/>
-            </a:pPr>
-            <a:r>
-              <a:rPr lang="en-GB" dirty="0"/>
-              <a:t>   </a:t>
-            </a:r>
-            <a:r>
-              <a:rPr lang="en-GB" sz="2400" dirty="0"/>
-              <a:t>- </a:t>
-            </a:r>
-            <a:r>
-              <a:rPr lang="en-GB" sz="2400" i="1" dirty="0"/>
-              <a:t>The Meaning of </a:t>
-            </a:r>
-            <a:r>
-              <a:rPr lang="en-GB" sz="2400" i="1" dirty="0" err="1"/>
-              <a:t>Liff</a:t>
-            </a:r>
-            <a:r>
-              <a:rPr lang="en-GB" sz="2400" dirty="0"/>
-              <a:t> (Douglas Adams &amp; John Lloyd)</a:t>
-            </a:r>
           </a:p>
         </p:txBody>
       </p:sp>
     </p:spTree>
     <p:extLst>
       <p:ext uri="{BB962C8B-B14F-4D97-AF65-F5344CB8AC3E}">
-        <p14:creationId xmlns:p14="http://schemas.microsoft.com/office/powerpoint/2010/main" val="3932977631"/>
+        <p14:creationId xmlns:p14="http://schemas.microsoft.com/office/powerpoint/2010/main" val="3220413897"/>
       </p:ext>
     </p:extLst>
   </p:cSld>
@@ -4350,7 +4302,7 @@
             </a:br>
             <a:r>
               <a:rPr lang="en-GB" b="1" dirty="0"/>
-              <a:t>Demonstrating</a:t>
+              <a:t>Kent (adj.)</a:t>
             </a:r>
           </a:p>
         </p:txBody>
@@ -4372,35 +4324,59 @@
           </a:bodyPr>
           <a:lstStyle/>
           <a:p>
-            <a:r>
-              <a:rPr lang="en-GB" dirty="0"/>
-              <a:t>If you think a student can’t do it, and you show it, they will believe you. Don’t even think it.</a:t>
-            </a:r>
-          </a:p>
-          <a:p>
-            <a:r>
-              <a:rPr lang="en-GB" dirty="0"/>
-              <a:t>It is very easy to lose patience and become dismissive. This makes students “disengage.”</a:t>
-            </a:r>
-          </a:p>
-          <a:p>
-            <a:r>
-              <a:rPr lang="en-GB" dirty="0"/>
-              <a:t>This can sometimes be a real challenge.</a:t>
-            </a:r>
-          </a:p>
-          <a:p>
-            <a:pPr marL="0" indent="0">
+            <a:pPr marL="0" lvl="0" indent="0">
+              <a:buNone/>
+            </a:pPr>
+            <a:r>
+              <a:rPr lang="en-GB" dirty="0"/>
+              <a:t>Politely determined not to help despite a violent urge to the contrary. </a:t>
+            </a:r>
+            <a:r>
+              <a:rPr lang="en-GB" i="1" dirty="0"/>
+              <a:t>Kent</a:t>
+            </a:r>
+            <a:r>
+              <a:rPr lang="en-GB" dirty="0"/>
+              <a:t> expressions are seen on the faces of people who are good at something watching someone else who can't do it at all.</a:t>
+            </a:r>
+          </a:p>
+          <a:p>
+            <a:pPr marL="0" lvl="0" indent="0">
               <a:buNone/>
             </a:pPr>
             <a:endParaRPr lang="en-GB" dirty="0"/>
+          </a:p>
+          <a:p>
+            <a:pPr marL="0" lvl="0" indent="0" algn="r">
+              <a:buNone/>
+            </a:pPr>
+            <a:r>
+              <a:rPr lang="en-GB" dirty="0"/>
+              <a:t>   </a:t>
+            </a:r>
+            <a:r>
+              <a:rPr lang="en-GB" sz="2400" dirty="0"/>
+              <a:t>- </a:t>
+            </a:r>
+            <a:r>
+              <a:rPr lang="en-GB" sz="2400" i="1" dirty="0"/>
+              <a:t>The Meaning of </a:t>
+            </a:r>
+            <a:r>
+              <a:rPr lang="en-GB" sz="2400" i="1" dirty="0" err="1"/>
+              <a:t>Liff</a:t>
+            </a:r>
+            <a:r>
+              <a:rPr lang="en-GB" sz="2400" dirty="0"/>
+              <a:t> (Douglas Adams &amp; John Lloyd)</a:t>
+            </a:r>
           </a:p>
         </p:txBody>
       </p:sp>
     </p:spTree>
     <p:extLst>
       <p:ext uri="{BB962C8B-B14F-4D97-AF65-F5344CB8AC3E}">
-        <p14:creationId xmlns:p14="http://schemas.microsoft.com/office/powerpoint/2010/main" val="2959751476"/>
+        <p14:creationId xmlns:p14="http://schemas.microsoft.com/office/powerpoint/2010/main" val="3932977631"/>
       </p:ext>
     </p:extLst>
   </p:cSld>
@@ -4462,7 +4438,7 @@
           <a:p>
             <a:r>
               <a:rPr lang="en-GB" b="1" dirty="0"/>
-              <a:t>Dignity and Respect</a:t>
+              <a:t>Web site</a:t>
             </a:r>
           </a:p>
         </p:txBody>
@@ -4485,69 +4461,33 @@
         </p:spPr>
         <p:txBody>
           <a:bodyPr>
-            <a:normAutofit fontScale="85000" lnSpcReduction="20000"/>
+            <a:normAutofit/>
           </a:bodyPr>
           <a:lstStyle/>
           <a:p>
+            <a:pPr marL="0" lvl="0" indent="0">
+              <a:buNone/>
+            </a:pPr>
+            <a:r>
+              <a:rPr lang="en-GB" dirty="0"/>
+              <a:t>My Aber website has this information on it, and more (including a timesheet template)</a:t>
+            </a:r>
+          </a:p>
+          <a:p>
             <a:pPr lvl="0"/>
-            <a:r>
-              <a:rPr lang="en-GB" dirty="0"/>
-              <a:t>Equality and Diversity – equal respect for all:</a:t>
-            </a:r>
+            <a:endParaRPr lang="en-GB" dirty="0"/>
           </a:p>
           <a:p>
             <a:pPr marL="0" lvl="0" indent="0">
               <a:buNone/>
             </a:pPr>
             <a:r>
-              <a:rPr lang="en-GB" dirty="0">
+              <a:rPr lang="en-GB" sz="2400" dirty="0">
                 <a:hlinkClick r:id="rId3"/>
               </a:rPr>
-              <a:t>https://www.aber.ac.uk/en/cs/equality-and-diversity/</a:t>
-            </a:r>
-            <a:endParaRPr lang="en-GB" dirty="0"/>
-          </a:p>
-          <a:p>
-            <a:pPr lvl="0"/>
-            <a:r>
-              <a:rPr lang="en-GB" dirty="0"/>
-              <a:t>Dignity and respect policy </a:t>
-            </a:r>
-          </a:p>
-          <a:p>
-            <a:pPr lvl="0"/>
-            <a:r>
-              <a:rPr lang="en-GB" dirty="0"/>
-              <a:t>Disabilities, learning differences and anxieties are not always visible</a:t>
-            </a:r>
-          </a:p>
-          <a:p>
-            <a:pPr lvl="0"/>
-            <a:r>
-              <a:rPr lang="en-GB" dirty="0"/>
-              <a:t>Be kind and patient</a:t>
-            </a:r>
-          </a:p>
-          <a:p>
-            <a:pPr lvl="0"/>
-            <a:r>
-              <a:rPr lang="en-GB" dirty="0"/>
-              <a:t>Help people towards understanding rather than show what you know</a:t>
-            </a:r>
-          </a:p>
-          <a:p>
-            <a:pPr lvl="0"/>
-            <a:r>
-              <a:rPr lang="en-GB" dirty="0"/>
-              <a:t>Respect personal space (!)</a:t>
-            </a:r>
-          </a:p>
-          <a:p>
-            <a:pPr lvl="0"/>
-            <a:r>
-              <a:rPr lang="en-GB" dirty="0"/>
-              <a:t>You are representing the University</a:t>
-            </a:r>
+              <a:t>https://users.aber.ac.uk/jcf12/teaching/demonstrating/landing/</a:t>
+            </a:r>
+            <a:endParaRPr lang="en-GB" sz="2400" dirty="0"/>
           </a:p>
           <a:p>
             <a:endParaRPr lang="en-GB" dirty="0"/>
@@ -4600,7 +4540,12 @@
             <p:ph type="title"/>
           </p:nvPr>
         </p:nvSpPr>
-        <p:spPr/>
+        <p:spPr>
+          <a:xfrm>
+            <a:off x="457200" y="274638"/>
+            <a:ext cx="8229600" cy="634082"/>
+          </a:xfrm>
+        </p:spPr>
         <p:txBody>
           <a:bodyPr>
             <a:normAutofit fontScale="90000"/>
@@ -4615,7 +4560,7 @@
             </a:br>
             <a:r>
               <a:rPr lang="en-GB" b="1" dirty="0"/>
-              <a:t>End of session</a:t>
+              <a:t>Demonstrating</a:t>
             </a:r>
           </a:p>
         </p:txBody>
@@ -4637,31 +4582,27 @@
           </a:bodyPr>
           <a:lstStyle/>
           <a:p>
-            <a:pPr marL="0" lvl="0" indent="0">
+            <a:r>
+              <a:rPr lang="en-GB" dirty="0"/>
+              <a:t>If you think a student can’t do it, and you show it, they will believe you. Don’t even think it.</a:t>
+            </a:r>
+          </a:p>
+          <a:p>
+            <a:r>
+              <a:rPr lang="en-GB" dirty="0"/>
+              <a:t>It is very easy to lose patience and become dismissive. This makes students “disengage.”</a:t>
+            </a:r>
+          </a:p>
+          <a:p>
+            <a:r>
+              <a:rPr lang="en-GB" dirty="0"/>
+              <a:t>This can sometimes be a real challenge.</a:t>
+            </a:r>
+          </a:p>
+          <a:p>
+            <a:pPr marL="0" indent="0">
               <a:buNone/>
             </a:pPr>
-            <a:endParaRPr lang="en-GB" dirty="0"/>
-          </a:p>
-          <a:p>
-            <a:pPr lvl="0"/>
-            <a:r>
-              <a:rPr lang="en-GB" dirty="0"/>
-              <a:t>Try to make sure student work is reasonable before sign-off</a:t>
-            </a:r>
-          </a:p>
-          <a:p>
-            <a:r>
-              <a:rPr lang="en-GB" dirty="0"/>
-              <a:t>You need to know what the requirements are</a:t>
-            </a:r>
-          </a:p>
-          <a:p>
-            <a:r>
-              <a:rPr lang="en-GB" dirty="0"/>
-              <a:t>Feedback any issues to module coordinator</a:t>
-            </a:r>
-          </a:p>
-          <a:p>
             <a:endParaRPr lang="en-GB" dirty="0"/>
           </a:p>
         </p:txBody>
@@ -4669,7 +4610,7 @@
     </p:spTree>
     <p:extLst>
       <p:ext uri="{BB962C8B-B14F-4D97-AF65-F5344CB8AC3E}">
-        <p14:creationId xmlns:p14="http://schemas.microsoft.com/office/powerpoint/2010/main" val="4244559619"/>
+        <p14:creationId xmlns:p14="http://schemas.microsoft.com/office/powerpoint/2010/main" val="2959751476"/>
       </p:ext>
     </p:extLst>
   </p:cSld>
@@ -4725,14 +4666,14 @@
           <a:lstStyle/>
           <a:p>
             <a:br>
-              <a:rPr lang="en-GB" u="sng" dirty="0"/>
+              <a:rPr lang="en-GB" dirty="0"/>
             </a:br>
             <a:br>
-              <a:rPr lang="en-GB" u="sng" dirty="0"/>
+              <a:rPr lang="en-GB" dirty="0"/>
             </a:br>
             <a:r>
-              <a:rPr lang="en-GB" b="1" u="sng" dirty="0"/>
-              <a:t>Please turn up.</a:t>
+              <a:rPr lang="en-GB" b="1" dirty="0"/>
+              <a:t>End of session</a:t>
             </a:r>
           </a:p>
         </p:txBody>
@@ -4747,54 +4688,46 @@
             <p:ph idx="1"/>
           </p:nvPr>
         </p:nvSpPr>
-        <p:spPr>
-          <a:xfrm>
-            <a:off x="457200" y="1772816"/>
-            <a:ext cx="8229600" cy="4353347"/>
-          </a:xfrm>
-        </p:spPr>
+        <p:spPr/>
         <p:txBody>
           <a:bodyPr>
             <a:normAutofit/>
           </a:bodyPr>
           <a:lstStyle/>
           <a:p>
-            <a:r>
-              <a:rPr lang="en-GB" dirty="0"/>
-              <a:t>If you don’t come to a session you’re supposed to attend, it puts an unfair load on the other demonstrators and the lecturer.</a:t>
-            </a:r>
-          </a:p>
-          <a:p>
-            <a:r>
-              <a:rPr lang="en-GB" dirty="0"/>
-              <a:t>Students might not get seen. They might start to fall behind.</a:t>
-            </a:r>
-          </a:p>
-          <a:p>
-            <a:r>
-              <a:rPr lang="en-GB" dirty="0"/>
-              <a:t>If you can’t come, </a:t>
-            </a:r>
-            <a:r>
-              <a:rPr lang="en-GB" b="1" u="sng" dirty="0">
-                <a:solidFill>
-                  <a:srgbClr val="CC0000"/>
-                </a:solidFill>
-              </a:rPr>
-              <a:t>tell us in good time.</a:t>
-            </a:r>
-            <a:endParaRPr lang="en-GB" u="sng" dirty="0">
-              <a:solidFill>
-                <a:srgbClr val="CC0000"/>
-              </a:solidFill>
-            </a:endParaRPr>
+            <a:pPr marL="0" lvl="0" indent="0">
+              <a:buNone/>
+            </a:pPr>
+            <a:endParaRPr lang="en-GB" dirty="0"/>
+          </a:p>
+          <a:p>
+            <a:pPr lvl="0"/>
+            <a:r>
+              <a:rPr lang="en-GB" dirty="0"/>
+              <a:t>Try to make sure student work is reasonable before sign-off</a:t>
+            </a:r>
+          </a:p>
+          <a:p>
+            <a:r>
+              <a:rPr lang="en-GB" dirty="0"/>
+              <a:t>You need to know what the requirements are</a:t>
+            </a:r>
+          </a:p>
+          <a:p>
+            <a:r>
+              <a:rPr lang="en-GB" dirty="0"/>
+              <a:t>Feedback any issues to module coordinator</a:t>
+            </a:r>
+          </a:p>
+          <a:p>
+            <a:endParaRPr lang="en-GB" dirty="0"/>
           </a:p>
         </p:txBody>
       </p:sp>
     </p:spTree>
     <p:extLst>
       <p:ext uri="{BB962C8B-B14F-4D97-AF65-F5344CB8AC3E}">
-        <p14:creationId xmlns:p14="http://schemas.microsoft.com/office/powerpoint/2010/main" val="550045699"/>
+        <p14:creationId xmlns:p14="http://schemas.microsoft.com/office/powerpoint/2010/main" val="4244559619"/>
       </p:ext>
     </p:extLst>
   </p:cSld>
@@ -4850,6 +4783,131 @@
           <a:lstStyle/>
           <a:p>
             <a:br>
+              <a:rPr lang="en-GB" u="sng" dirty="0"/>
+            </a:br>
+            <a:br>
+              <a:rPr lang="en-GB" u="sng" dirty="0"/>
+            </a:br>
+            <a:r>
+              <a:rPr lang="en-GB" b="1" u="sng" dirty="0"/>
+              <a:t>Please turn up.</a:t>
+            </a:r>
+          </a:p>
+        </p:txBody>
+      </p:sp>
+      <p:sp>
+        <p:nvSpPr>
+          <p:cNvPr id="3" name="Content Placeholder 2"/>
+          <p:cNvSpPr>
+            <a:spLocks noGrp="1"/>
+          </p:cNvSpPr>
+          <p:nvPr>
+            <p:ph idx="1"/>
+          </p:nvPr>
+        </p:nvSpPr>
+        <p:spPr>
+          <a:xfrm>
+            <a:off x="457200" y="1772816"/>
+            <a:ext cx="8229600" cy="4353347"/>
+          </a:xfrm>
+        </p:spPr>
+        <p:txBody>
+          <a:bodyPr>
+            <a:normAutofit/>
+          </a:bodyPr>
+          <a:lstStyle/>
+          <a:p>
+            <a:r>
+              <a:rPr lang="en-GB" dirty="0"/>
+              <a:t>If you don’t come to a session you’re supposed to attend, it puts an unfair load on the other demonstrators and the lecturer.</a:t>
+            </a:r>
+          </a:p>
+          <a:p>
+            <a:r>
+              <a:rPr lang="en-GB" dirty="0"/>
+              <a:t>Students might not get seen. They might start to fall behind.</a:t>
+            </a:r>
+          </a:p>
+          <a:p>
+            <a:r>
+              <a:rPr lang="en-GB" dirty="0"/>
+              <a:t>If you can’t come, </a:t>
+            </a:r>
+            <a:r>
+              <a:rPr lang="en-GB" b="1" u="sng" dirty="0">
+                <a:solidFill>
+                  <a:srgbClr val="CC0000"/>
+                </a:solidFill>
+              </a:rPr>
+              <a:t>tell us in good time.</a:t>
+            </a:r>
+            <a:endParaRPr lang="en-GB" u="sng" dirty="0">
+              <a:solidFill>
+                <a:srgbClr val="CC0000"/>
+              </a:solidFill>
+            </a:endParaRPr>
+          </a:p>
+        </p:txBody>
+      </p:sp>
+    </p:spTree>
+    <p:extLst>
+      <p:ext uri="{BB962C8B-B14F-4D97-AF65-F5344CB8AC3E}">
+        <p14:creationId xmlns:p14="http://schemas.microsoft.com/office/powerpoint/2010/main" val="550045699"/>
+      </p:ext>
+    </p:extLst>
+  </p:cSld>
+  <p:clrMapOvr>
+    <a:masterClrMapping/>
+  </p:clrMapOvr>
+</p:sld>
+</file>
+
+<file path=ppt/slides/slide23.xml><?xml version="1.0" encoding="utf-8"?>
+<p:sld xmlns:a="http://schemas.openxmlformats.org/drawingml/2006/main" xmlns:r="http://schemas.openxmlformats.org/officeDocument/2006/relationships" xmlns:p="http://schemas.openxmlformats.org/presentationml/2006/main">
+  <p:cSld>
+    <p:bg>
+      <p:bgPr>
+        <a:blipFill rotWithShape="1">
+          <a:blip r:embed="rId2"/>
+          <a:stretch>
+            <a:fillRect/>
+          </a:stretch>
+        </a:blipFill>
+        <a:effectLst/>
+      </p:bgPr>
+    </p:bg>
+    <p:spTree>
+      <p:nvGrpSpPr>
+        <p:cNvPr id="1" name=""/>
+        <p:cNvGrpSpPr/>
+        <p:nvPr/>
+      </p:nvGrpSpPr>
+      <p:grpSpPr>
+        <a:xfrm>
+          <a:off x="0" y="0"/>
+          <a:ext cx="0" cy="0"/>
+          <a:chOff x="0" y="0"/>
+          <a:chExt cx="0" cy="0"/>
+        </a:xfrm>
+      </p:grpSpPr>
+      <p:sp>
+        <p:nvSpPr>
+          <p:cNvPr id="2" name="Title 1"/>
+          <p:cNvSpPr>
+            <a:spLocks noGrp="1"/>
+          </p:cNvSpPr>
+          <p:nvPr>
+            <p:ph type="title"/>
+          </p:nvPr>
+        </p:nvSpPr>
+        <p:spPr/>
+        <p:txBody>
+          <a:bodyPr>
+            <a:normAutofit fontScale="90000"/>
+          </a:bodyPr>
+          <a:lstStyle/>
+          <a:p>
+            <a:br>
               <a:rPr lang="en-GB" dirty="0"/>
             </a:br>
             <a:br>
@@ -4917,7 +4975,7 @@
 </p:sld>
 </file>
 
-<file path=ppt/slides/slide23.xml><?xml version="1.0" encoding="utf-8"?>
+<file path=ppt/slides/slide24.xml><?xml version="1.0" encoding="utf-8"?>
 <p:sld xmlns:a="http://schemas.openxmlformats.org/drawingml/2006/main" xmlns:r="http://schemas.openxmlformats.org/officeDocument/2006/relationships" xmlns:p="http://schemas.openxmlformats.org/presentationml/2006/main">
   <p:cSld>
     <p:bg>
@@ -5065,8 +5123,8 @@
         </p:nvSpPr>
         <p:spPr>
           <a:xfrm>
-            <a:off x="457200" y="274638"/>
-            <a:ext cx="8229600" cy="1325562"/>
+            <a:off x="457200" y="764704"/>
+            <a:ext cx="8229600" cy="652934"/>
           </a:xfrm>
         </p:spPr>
         <p:txBody>
@@ -5075,12 +5133,9 @@
           </a:bodyPr>
           <a:lstStyle/>
           <a:p>
-            <a:br>
-              <a:rPr lang="en-GB" dirty="0"/>
-            </a:br>
             <a:r>
               <a:rPr lang="en-GB" b="1" dirty="0"/>
-              <a:t>All modules are different</a:t>
+              <a:t>Dignity and Respect</a:t>
             </a:r>
           </a:p>
         </p:txBody>
@@ -5097,31 +5152,77 @@
         </p:nvSpPr>
         <p:spPr>
           <a:xfrm>
-            <a:off x="457200" y="1772816"/>
-            <a:ext cx="8229600" cy="4353347"/>
+            <a:off x="457200" y="1988840"/>
+            <a:ext cx="8229600" cy="4137323"/>
           </a:xfrm>
         </p:spPr>
         <p:txBody>
           <a:bodyPr>
-            <a:normAutofit/>
+            <a:normAutofit fontScale="85000" lnSpcReduction="20000"/>
           </a:bodyPr>
           <a:lstStyle/>
           <a:p>
             <a:pPr lvl="0"/>
             <a:r>
               <a:rPr lang="en-GB" dirty="0"/>
-              <a:t>I’ve tried to cover everything but will have missed things</a:t>
-            </a:r>
+              <a:t>Equality and Diversity – equal respect for all:</a:t>
+            </a:r>
+          </a:p>
+          <a:p>
+            <a:pPr marL="0" lvl="0" indent="0">
+              <a:buNone/>
+            </a:pPr>
+            <a:r>
+              <a:rPr lang="en-GB" dirty="0">
+                <a:hlinkClick r:id="rId3"/>
+              </a:rPr>
+              <a:t>https://www.aber.ac.uk/en/cs/equality-and-diversity/</a:t>
+            </a:r>
+            <a:endParaRPr lang="en-GB" dirty="0"/>
           </a:p>
           <a:p>
             <a:pPr lvl="0"/>
             <a:r>
               <a:rPr lang="en-GB" dirty="0"/>
-              <a:t>If in doubt, talk to the module coordinator</a:t>
+              <a:t>Dignity and respect policy </a:t>
             </a:r>
           </a:p>
           <a:p>
             <a:pPr lvl="0"/>
+            <a:r>
+              <a:rPr lang="en-GB" dirty="0"/>
+              <a:t>Disabilities, learning differences and anxieties are not always visible</a:t>
+            </a:r>
+          </a:p>
+          <a:p>
+            <a:pPr lvl="0"/>
+            <a:r>
+              <a:rPr lang="en-GB" dirty="0"/>
+              <a:t>Be kind and patient</a:t>
+            </a:r>
+          </a:p>
+          <a:p>
+            <a:pPr lvl="0"/>
+            <a:r>
+              <a:rPr lang="en-GB" dirty="0"/>
+              <a:t>Help people towards understanding rather than show what you know</a:t>
+            </a:r>
+          </a:p>
+          <a:p>
+            <a:pPr lvl="0"/>
+            <a:r>
+              <a:rPr lang="en-GB" dirty="0"/>
+              <a:t>Respect personal space (!)</a:t>
+            </a:r>
+          </a:p>
+          <a:p>
+            <a:pPr lvl="0"/>
+            <a:r>
+              <a:rPr lang="en-GB" dirty="0"/>
+              <a:t>You are representing the University</a:t>
+            </a:r>
+          </a:p>
+          <a:p>
             <a:endParaRPr lang="en-GB" dirty="0"/>
           </a:p>
         </p:txBody>
@@ -5129,7 +5230,7 @@
     </p:spTree>
     <p:extLst>
       <p:ext uri="{BB962C8B-B14F-4D97-AF65-F5344CB8AC3E}">
-        <p14:creationId xmlns:p14="http://schemas.microsoft.com/office/powerpoint/2010/main" val="1864224064"/>
+        <p14:creationId xmlns:p14="http://schemas.microsoft.com/office/powerpoint/2010/main" val="3681226925"/>
       </p:ext>
     </p:extLst>
   </p:cSld>
@@ -5177,7 +5278,12 @@
             <p:ph type="title"/>
           </p:nvPr>
         </p:nvSpPr>
-        <p:spPr/>
+        <p:spPr>
+          <a:xfrm>
+            <a:off x="457200" y="274638"/>
+            <a:ext cx="8229600" cy="1325562"/>
+          </a:xfrm>
+        </p:spPr>
         <p:txBody>
           <a:bodyPr>
             <a:normAutofit fontScale="90000"/>
@@ -5189,7 +5295,7 @@
             </a:br>
             <a:r>
               <a:rPr lang="en-GB" b="1" dirty="0"/>
-              <a:t>Responsibilities</a:t>
+              <a:t>All modules are different</a:t>
             </a:r>
           </a:p>
         </p:txBody>
@@ -5204,87 +5310,33 @@
             <p:ph idx="1"/>
           </p:nvPr>
         </p:nvSpPr>
-        <p:spPr/>
+        <p:spPr>
+          <a:xfrm>
+            <a:off x="457200" y="1772816"/>
+            <a:ext cx="8229600" cy="4353347"/>
+          </a:xfrm>
+        </p:spPr>
         <p:txBody>
           <a:bodyPr>
-            <a:normAutofit fontScale="92500" lnSpcReduction="20000"/>
+            <a:normAutofit/>
           </a:bodyPr>
           <a:lstStyle/>
           <a:p>
             <a:pPr lvl="0"/>
-            <a:endParaRPr lang="en-GB" dirty="0"/>
+            <a:r>
+              <a:rPr lang="en-GB" dirty="0"/>
+              <a:t>I’ve tried to cover everything but will have missed things</a:t>
+            </a:r>
           </a:p>
           <a:p>
             <a:pPr lvl="0"/>
             <a:r>
               <a:rPr lang="en-GB" dirty="0"/>
-              <a:t>Best ability is availability – </a:t>
-            </a:r>
-            <a:r>
-              <a:rPr lang="en-GB" b="1" dirty="0"/>
-              <a:t>be on time</a:t>
+              <a:t>If in doubt, talk to the module coordinator</a:t>
             </a:r>
           </a:p>
           <a:p>
             <a:pPr lvl="0"/>
-            <a:r>
-              <a:rPr lang="en-GB" b="1" dirty="0"/>
-              <a:t>Be prepared </a:t>
-            </a:r>
-            <a:r>
-              <a:rPr lang="en-GB" dirty="0"/>
-              <a:t>for the class content</a:t>
-            </a:r>
-          </a:p>
-          <a:p>
-            <a:r>
-              <a:rPr lang="en-GB" b="1" dirty="0"/>
-              <a:t>Be proactive</a:t>
-            </a:r>
-            <a:r>
-              <a:rPr lang="en-GB" dirty="0"/>
-              <a:t> – don’t wait to be asked</a:t>
-            </a:r>
-          </a:p>
-          <a:p>
-            <a:r>
-              <a:rPr lang="en-GB" dirty="0"/>
-              <a:t>Be ready to interact with people</a:t>
-            </a:r>
-          </a:p>
-          <a:p>
-            <a:r>
-              <a:rPr lang="en-GB" dirty="0"/>
-              <a:t>Focus for the length of the class</a:t>
-            </a:r>
-          </a:p>
-          <a:p>
-            <a:r>
-              <a:rPr lang="en-GB" dirty="0"/>
-              <a:t>Don’t come if you are unwell – but </a:t>
-            </a:r>
-            <a:r>
-              <a:rPr lang="en-GB" b="1" dirty="0"/>
-              <a:t>let us know</a:t>
-            </a:r>
-          </a:p>
-          <a:p>
-            <a:pPr lvl="0"/>
-            <a:r>
-              <a:rPr lang="en-GB" dirty="0"/>
-              <a:t>Respect confidentiality</a:t>
-            </a:r>
-          </a:p>
-          <a:p>
-            <a:r>
-              <a:rPr lang="en-GB" dirty="0"/>
-              <a:t>Declare conflicts of interest</a:t>
-            </a:r>
-          </a:p>
-          <a:p>
-            <a:pPr marL="0" indent="0">
-              <a:buNone/>
-            </a:pPr>
             <a:endParaRPr lang="en-GB" dirty="0"/>
           </a:p>
         </p:txBody>
@@ -5292,7 +5344,7 @@
     </p:spTree>
     <p:extLst>
       <p:ext uri="{BB962C8B-B14F-4D97-AF65-F5344CB8AC3E}">
-        <p14:creationId xmlns:p14="http://schemas.microsoft.com/office/powerpoint/2010/main" val="2958414851"/>
+        <p14:creationId xmlns:p14="http://schemas.microsoft.com/office/powerpoint/2010/main" val="1864224064"/>
       </p:ext>
     </p:extLst>
   </p:cSld>
@@ -5352,7 +5404,7 @@
             </a:br>
             <a:r>
               <a:rPr lang="en-GB" b="1" dirty="0"/>
-              <a:t>Emergencies</a:t>
+              <a:t>Responsibilities</a:t>
             </a:r>
           </a:p>
         </p:txBody>
@@ -5370,45 +5422,84 @@
         <p:spPr/>
         <p:txBody>
           <a:bodyPr>
-            <a:normAutofit/>
+            <a:normAutofit fontScale="92500" lnSpcReduction="20000"/>
           </a:bodyPr>
           <a:lstStyle/>
           <a:p>
             <a:pPr lvl="0"/>
-            <a:r>
-              <a:rPr lang="en-GB" dirty="0"/>
-              <a:t>You are not alone and responsible for everything – ask for help</a:t>
-            </a:r>
+            <a:endParaRPr lang="en-GB" dirty="0"/>
           </a:p>
           <a:p>
             <a:pPr lvl="0"/>
             <a:r>
               <a:rPr lang="en-GB" dirty="0"/>
-              <a:t>We try to have more experienced demonstrators available, and the lecturer will always be available</a:t>
+              <a:t>Best ability is availability – </a:t>
+            </a:r>
+            <a:r>
+              <a:rPr lang="en-GB" b="1" dirty="0"/>
+              <a:t>be on time</a:t>
             </a:r>
           </a:p>
           <a:p>
             <a:pPr lvl="0"/>
             <a:r>
-              <a:rPr lang="en-GB" dirty="0"/>
-              <a:t>Fire </a:t>
+              <a:rPr lang="en-GB" b="1" dirty="0"/>
+              <a:t>Be prepared </a:t>
+            </a:r>
+            <a:r>
+              <a:rPr lang="en-GB" dirty="0"/>
+              <a:t>for the class content</a:t>
+            </a:r>
+          </a:p>
+          <a:p>
+            <a:r>
+              <a:rPr lang="en-GB" b="1" dirty="0"/>
+              <a:t>Be proactive</a:t>
+            </a:r>
+            <a:r>
+              <a:rPr lang="en-GB" dirty="0"/>
+              <a:t> – don’t wait to be asked</a:t>
+            </a:r>
+          </a:p>
+          <a:p>
+            <a:r>
+              <a:rPr lang="en-GB" dirty="0"/>
+              <a:t>Be ready to interact with people</a:t>
+            </a:r>
+          </a:p>
+          <a:p>
+            <a:r>
+              <a:rPr lang="en-GB" dirty="0"/>
+              <a:t>Focus for the length of the class</a:t>
+            </a:r>
+          </a:p>
+          <a:p>
+            <a:r>
+              <a:rPr lang="en-GB" dirty="0"/>
+              <a:t>Don’t come if you are unwell – but </a:t>
+            </a:r>
+            <a:r>
+              <a:rPr lang="en-GB" b="1" dirty="0"/>
+              <a:t>let us know</a:t>
             </a:r>
           </a:p>
           <a:p>
             <a:pPr lvl="0"/>
             <a:r>
               <a:rPr lang="en-GB" dirty="0"/>
-              <a:t>Illness – look for first aiders</a:t>
-            </a:r>
-          </a:p>
-          <a:p>
-            <a:pPr lvl="0"/>
-            <a:r>
-              <a:rPr lang="en-GB" dirty="0"/>
-              <a:t>Disruptiveness – seek help from lecturing staff </a:t>
-            </a:r>
-          </a:p>
-          <a:p>
+              <a:t>Respect confidentiality</a:t>
+            </a:r>
+          </a:p>
+          <a:p>
+            <a:r>
+              <a:rPr lang="en-GB" dirty="0"/>
+              <a:t>Declare conflicts of interest</a:t>
+            </a:r>
+          </a:p>
+          <a:p>
+            <a:pPr marL="0" indent="0">
+              <a:buNone/>
+            </a:pPr>
             <a:endParaRPr lang="en-GB" dirty="0"/>
           </a:p>
         </p:txBody>
@@ -5416,7 +5507,7 @@
     </p:spTree>
     <p:extLst>
       <p:ext uri="{BB962C8B-B14F-4D97-AF65-F5344CB8AC3E}">
-        <p14:creationId xmlns:p14="http://schemas.microsoft.com/office/powerpoint/2010/main" val="2439188838"/>
+        <p14:creationId xmlns:p14="http://schemas.microsoft.com/office/powerpoint/2010/main" val="2958414851"/>
       </p:ext>
     </p:extLst>
   </p:cSld>
@@ -5476,7 +5567,7 @@
             </a:br>
             <a:r>
               <a:rPr lang="en-GB" b="1" dirty="0"/>
-              <a:t>Emergency contacts</a:t>
+              <a:t>Emergencies</a:t>
             </a:r>
           </a:p>
         </p:txBody>
@@ -5498,47 +5589,41 @@
           </a:bodyPr>
           <a:lstStyle/>
           <a:p>
-            <a:pPr marL="457200" lvl="1" indent="0">
-              <a:buNone/>
-            </a:pPr>
-            <a:r>
-              <a:rPr lang="en-GB" dirty="0"/>
-              <a:t>It is very unlikely you’ll need these numbers, but:</a:t>
-            </a:r>
-          </a:p>
-          <a:p>
-            <a:pPr lvl="1">
-              <a:buFont typeface="Arial" panose="020B0604020202020204" pitchFamily="34" charset="0"/>
-              <a:buChar char="•"/>
-            </a:pPr>
-            <a:r>
-              <a:rPr lang="en-GB" dirty="0"/>
-              <a:t>In emergencies, call 2424 on an internal phone (01970 622424 on a mobile) for </a:t>
-            </a:r>
-            <a:r>
-              <a:rPr lang="en-GB" dirty="0" err="1"/>
-              <a:t>CompSci</a:t>
-            </a:r>
-            <a:r>
-              <a:rPr lang="en-GB" dirty="0"/>
-              <a:t> reception.</a:t>
-            </a:r>
-          </a:p>
-          <a:p>
-            <a:pPr lvl="1">
-              <a:buFont typeface="Arial" panose="020B0604020202020204" pitchFamily="34" charset="0"/>
-              <a:buChar char="•"/>
-            </a:pPr>
-            <a:r>
-              <a:rPr lang="en-GB" dirty="0"/>
-              <a:t>In extreme cases, call 2649 for Security at the porter’s lodge.</a:t>
-            </a:r>
-          </a:p>
-          <a:p>
-            <a:pPr>
-              <a:buFont typeface="Arial" panose="020B0604020202020204" pitchFamily="34" charset="0"/>
-              <a:buChar char="•"/>
-            </a:pPr>
+            <a:pPr lvl="0"/>
+            <a:r>
+              <a:rPr lang="en-GB" dirty="0"/>
+              <a:t>You are not alone and responsible for everything – ask for help</a:t>
+            </a:r>
+          </a:p>
+          <a:p>
+            <a:pPr lvl="0"/>
+            <a:r>
+              <a:rPr lang="en-GB" dirty="0"/>
+              <a:t>We try to have more experienced demonstrators available, and the lecturer will always be available</a:t>
+            </a:r>
+          </a:p>
+          <a:p>
+            <a:pPr lvl="0"/>
+            <a:r>
+              <a:rPr lang="en-GB" dirty="0"/>
+              <a:t>Fire </a:t>
+            </a:r>
+          </a:p>
+          <a:p>
+            <a:pPr lvl="0"/>
+            <a:r>
+              <a:rPr lang="en-GB" dirty="0"/>
+              <a:t>Illness – look for first aiders</a:t>
+            </a:r>
+          </a:p>
+          <a:p>
+            <a:pPr lvl="0"/>
+            <a:r>
+              <a:rPr lang="en-GB" dirty="0"/>
+              <a:t>Disruptiveness – seek help from lecturing staff </a:t>
+            </a:r>
+          </a:p>
+          <a:p>
             <a:endParaRPr lang="en-GB" dirty="0"/>
           </a:p>
         </p:txBody>
@@ -5546,7 +5631,7 @@
     </p:spTree>
     <p:extLst>
       <p:ext uri="{BB962C8B-B14F-4D97-AF65-F5344CB8AC3E}">
-        <p14:creationId xmlns:p14="http://schemas.microsoft.com/office/powerpoint/2010/main" val="735746091"/>
+        <p14:creationId xmlns:p14="http://schemas.microsoft.com/office/powerpoint/2010/main" val="2439188838"/>
       </p:ext>
     </p:extLst>
   </p:cSld>
@@ -5604,12 +5689,9 @@
             <a:br>
               <a:rPr lang="en-GB" dirty="0"/>
             </a:br>
-            <a:br>
+            <a:r>
               <a:rPr lang="en-GB" b="1" dirty="0"/>
-            </a:br>
-            <a:r>
-              <a:rPr lang="en-GB" b="1" dirty="0"/>
-              <a:t>Practicalities</a:t>
+              <a:t>Emergency contacts</a:t>
             </a:r>
           </a:p>
         </p:txBody>
@@ -5627,76 +5709,51 @@
         <p:spPr/>
         <p:txBody>
           <a:bodyPr>
-            <a:normAutofit fontScale="85000" lnSpcReduction="20000"/>
+            <a:normAutofit/>
           </a:bodyPr>
           <a:lstStyle/>
           <a:p>
-            <a:pPr lvl="0"/>
-            <a:endParaRPr lang="en-GB" dirty="0"/>
-          </a:p>
-          <a:p>
-            <a:r>
-              <a:rPr lang="en-GB" dirty="0"/>
-              <a:t>Register on </a:t>
+            <a:pPr marL="457200" lvl="1" indent="0">
+              <a:buNone/>
+            </a:pPr>
+            <a:r>
+              <a:rPr lang="en-GB" dirty="0"/>
+              <a:t>It is very unlikely you’ll need these numbers, but:</a:t>
+            </a:r>
+          </a:p>
+          <a:p>
+            <a:pPr lvl="1">
+              <a:buFont typeface="Arial" panose="020B0604020202020204" pitchFamily="34" charset="0"/>
+              <a:buChar char="•"/>
+            </a:pPr>
+            <a:r>
+              <a:rPr lang="en-GB" dirty="0"/>
+              <a:t>In emergencies, call 2424 on an internal phone (01970 622424 on a mobile) for </a:t>
             </a:r>
             <a:r>
               <a:rPr lang="en-GB" dirty="0" err="1"/>
-              <a:t>Aberworks</a:t>
-            </a:r>
-            <a:endParaRPr lang="en-GB" dirty="0"/>
-          </a:p>
-          <a:p>
-            <a:r>
-              <a:rPr lang="en-GB" dirty="0"/>
-              <a:t>Right to work checks</a:t>
-            </a:r>
-          </a:p>
-          <a:p>
-            <a:r>
-              <a:rPr lang="en-GB" dirty="0"/>
-              <a:t>Apply for role</a:t>
-            </a:r>
-          </a:p>
-          <a:p>
-            <a:r>
-              <a:rPr lang="en-GB" dirty="0"/>
-              <a:t>Check email regularly!</a:t>
-            </a:r>
-          </a:p>
-          <a:p>
-            <a:r>
-              <a:rPr lang="en-GB" dirty="0"/>
-              <a:t>Payment by monthly timesheet:</a:t>
-            </a:r>
-          </a:p>
-          <a:p>
-            <a:pPr marL="0" indent="0">
-              <a:buNone/>
+              <a:t>CompSci</a:t>
+            </a:r>
+            <a:r>
+              <a:rPr lang="en-GB" dirty="0"/>
+              <a:t> reception.</a:t>
+            </a:r>
+          </a:p>
+          <a:p>
+            <a:pPr lvl="1">
+              <a:buFont typeface="Arial" panose="020B0604020202020204" pitchFamily="34" charset="0"/>
+              <a:buChar char="•"/>
             </a:pPr>
             <a:r>
               <a:rPr lang="en-GB" dirty="0"/>
-              <a:t>	Only slots for each month</a:t>
-            </a:r>
-          </a:p>
-          <a:p>
-            <a:pPr marL="0" indent="0">
-              <a:buNone/>
+              <a:t>In extreme cases, call 2649 for Security at the porter’s lodge.</a:t>
+            </a:r>
+          </a:p>
+          <a:p>
+            <a:pPr>
+              <a:buFont typeface="Arial" panose="020B0604020202020204" pitchFamily="34" charset="0"/>
+              <a:buChar char="•"/>
             </a:pPr>
-            <a:r>
-              <a:rPr lang="en-GB" dirty="0"/>
-              <a:t>	Submit as soon as you can to ensure 				payment</a:t>
-            </a:r>
-          </a:p>
-          <a:p>
-            <a:pPr marL="0" indent="0">
-              <a:buNone/>
-            </a:pPr>
-            <a:r>
-              <a:rPr lang="en-GB" dirty="0"/>
-              <a:t>	Enter all the details of modules, times, 	employee 			number</a:t>
-            </a:r>
-          </a:p>
-          <a:p>
             <a:endParaRPr lang="en-GB" dirty="0"/>
           </a:p>
         </p:txBody>
@@ -5704,7 +5761,7 @@
     </p:spTree>
     <p:extLst>
       <p:ext uri="{BB962C8B-B14F-4D97-AF65-F5344CB8AC3E}">
-        <p14:creationId xmlns:p14="http://schemas.microsoft.com/office/powerpoint/2010/main" val="3170940212"/>
+        <p14:creationId xmlns:p14="http://schemas.microsoft.com/office/powerpoint/2010/main" val="735746091"/>
       </p:ext>
     </p:extLst>
   </p:cSld>
@@ -5752,12 +5809,7 @@
             <p:ph type="title"/>
           </p:nvPr>
         </p:nvSpPr>
-        <p:spPr>
-          <a:xfrm>
-            <a:off x="457200" y="274638"/>
-            <a:ext cx="8229600" cy="634082"/>
-          </a:xfrm>
-        </p:spPr>
+        <p:spPr/>
         <p:txBody>
           <a:bodyPr>
             <a:normAutofit fontScale="90000"/>
@@ -5768,11 +5820,11 @@
               <a:rPr lang="en-GB" dirty="0"/>
             </a:br>
             <a:br>
-              <a:rPr lang="en-GB" dirty="0"/>
+              <a:rPr lang="en-GB" b="1" dirty="0"/>
             </a:br>
             <a:r>
               <a:rPr lang="en-GB" b="1" dirty="0"/>
-              <a:t>Worksheet signoff system</a:t>
+              <a:t>Practicalities</a:t>
             </a:r>
           </a:p>
         </p:txBody>
@@ -5790,58 +5842,76 @@
         <p:spPr/>
         <p:txBody>
           <a:bodyPr>
-            <a:normAutofit/>
+            <a:normAutofit fontScale="85000" lnSpcReduction="20000"/>
           </a:bodyPr>
           <a:lstStyle/>
           <a:p>
             <a:pPr lvl="0"/>
-            <a:r>
-              <a:rPr lang="en-GB" u="sng" dirty="0">
-                <a:hlinkClick r:id="rId3"/>
-              </a:rPr>
-              <a:t>https://signoff.dcs.aber.ac.uk</a:t>
-            </a:r>
-            <a:endParaRPr lang="en-GB" u="sng" dirty="0"/>
-          </a:p>
-          <a:p>
-            <a:pPr lvl="0"/>
-            <a:r>
-              <a:rPr lang="en-GB" dirty="0"/>
-              <a:t>You should be able to log in and you should see your module.</a:t>
-            </a:r>
-          </a:p>
-          <a:p>
-            <a:pPr lvl="0"/>
-            <a:r>
-              <a:rPr lang="en-GB" dirty="0"/>
-              <a:t>Three options (for demonstrators!)</a:t>
-            </a:r>
-          </a:p>
-          <a:p>
-            <a:pPr lvl="1"/>
-            <a:r>
-              <a:rPr lang="en-GB" dirty="0"/>
-              <a:t>Signoff</a:t>
-            </a:r>
-          </a:p>
-          <a:p>
-            <a:pPr lvl="1"/>
-            <a:r>
-              <a:rPr lang="en-GB" dirty="0"/>
-              <a:t>Queueing (students can add themselves to a queue for signoff).</a:t>
-            </a:r>
-          </a:p>
-          <a:p>
-            <a:pPr lvl="1"/>
-            <a:r>
-              <a:rPr lang="en-GB" dirty="0"/>
-              <a:t>Instructions</a:t>
+            <a:endParaRPr lang="en-GB" dirty="0"/>
+          </a:p>
+          <a:p>
+            <a:r>
+              <a:rPr lang="en-GB" dirty="0"/>
+              <a:t>Register on </a:t>
+            </a:r>
+            <a:r>
+              <a:rPr lang="en-GB" dirty="0" err="1"/>
+              <a:t>Aberworks</a:t>
+            </a:r>
+            <a:endParaRPr lang="en-GB" dirty="0"/>
+          </a:p>
+          <a:p>
+            <a:r>
+              <a:rPr lang="en-GB" dirty="0"/>
+              <a:t>Right to work checks</a:t>
+            </a:r>
+          </a:p>
+          <a:p>
+            <a:r>
+              <a:rPr lang="en-GB" dirty="0"/>
+              <a:t>Apply for role</a:t>
+            </a:r>
+          </a:p>
+          <a:p>
+            <a:r>
+              <a:rPr lang="en-GB" dirty="0"/>
+              <a:t>Check email regularly!</a:t>
+            </a:r>
+          </a:p>
+          <a:p>
+            <a:r>
+              <a:rPr lang="en-GB" dirty="0"/>
+              <a:t>Payment by monthly timesheet:</a:t>
             </a:r>
           </a:p>
           <a:p>
             <a:pPr marL="0" indent="0">
               <a:buNone/>
             </a:pPr>
+            <a:r>
+              <a:rPr lang="en-GB" dirty="0"/>
+              <a:t>	Only slots for each month</a:t>
+            </a:r>
+          </a:p>
+          <a:p>
+            <a:pPr marL="0" indent="0">
+              <a:buNone/>
+            </a:pPr>
+            <a:r>
+              <a:rPr lang="en-GB" dirty="0"/>
+              <a:t>	Submit as soon as you can to ensure 				payment</a:t>
+            </a:r>
+          </a:p>
+          <a:p>
+            <a:pPr marL="0" indent="0">
+              <a:buNone/>
+            </a:pPr>
+            <a:r>
+              <a:rPr lang="en-GB" dirty="0"/>
+              <a:t>	Enter all the details of modules, times, 	employee 			number</a:t>
+            </a:r>
+          </a:p>
+          <a:p>
             <a:endParaRPr lang="en-GB" dirty="0"/>
           </a:p>
         </p:txBody>
@@ -5849,7 +5919,7 @@
     </p:spTree>
     <p:extLst>
       <p:ext uri="{BB962C8B-B14F-4D97-AF65-F5344CB8AC3E}">
-        <p14:creationId xmlns:p14="http://schemas.microsoft.com/office/powerpoint/2010/main" val="3148399099"/>
+        <p14:creationId xmlns:p14="http://schemas.microsoft.com/office/powerpoint/2010/main" val="3170940212"/>
       </p:ext>
     </p:extLst>
   </p:cSld>
@@ -5922,42 +5992,79 @@
           </a:p>
         </p:txBody>
       </p:sp>
-      <p:pic>
-        <p:nvPicPr>
-          <p:cNvPr id="4" name="Content Placeholder 3">
-            <a:extLst>
-              <a:ext uri="{FF2B5EF4-FFF2-40B4-BE49-F238E27FC236}">
-                <a16:creationId xmlns:a16="http://schemas.microsoft.com/office/drawing/2014/main" id="{134F007C-F9BF-4103-9AAE-57E804EFECFA}"/>
-              </a:ext>
-            </a:extLst>
-          </p:cNvPr>
-          <p:cNvPicPr>
-            <a:picLocks noGrp="1" noChangeAspect="1"/>
-          </p:cNvPicPr>
+      <p:sp>
+        <p:nvSpPr>
+          <p:cNvPr id="3" name="Content Placeholder 2"/>
+          <p:cNvSpPr>
+            <a:spLocks noGrp="1"/>
+          </p:cNvSpPr>
           <p:nvPr>
             <p:ph idx="1"/>
           </p:nvPr>
-        </p:nvPicPr>
-        <p:blipFill>
-          <a:blip r:embed="rId3"/>
-          <a:stretch>
-            <a:fillRect/>
-          </a:stretch>
-        </p:blipFill>
-        <p:spPr>
-          <a:xfrm>
-            <a:off x="457200" y="1634331"/>
-            <a:ext cx="8229600" cy="4457700"/>
-          </a:xfrm>
-          <a:prstGeom prst="rect">
-            <a:avLst/>
-          </a:prstGeom>
-        </p:spPr>
-      </p:pic>
+        </p:nvSpPr>
+        <p:spPr/>
+        <p:txBody>
+          <a:bodyPr>
+            <a:normAutofit/>
+          </a:bodyPr>
+          <a:lstStyle/>
+          <a:p>
+            <a:pPr lvl="0"/>
+            <a:r>
+              <a:rPr lang="en-GB" u="sng" dirty="0">
+                <a:hlinkClick r:id="rId3"/>
+              </a:rPr>
+              <a:t>https://signoff.dcs.aber.ac.uk</a:t>
+            </a:r>
+            <a:endParaRPr lang="en-GB" u="sng" dirty="0"/>
+          </a:p>
+          <a:p>
+            <a:pPr lvl="0"/>
+            <a:r>
+              <a:rPr lang="en-GB" dirty="0"/>
+              <a:t>You should be able to log in and you should see your module.</a:t>
+            </a:r>
+          </a:p>
+          <a:p>
+            <a:pPr lvl="0"/>
+            <a:r>
+              <a:rPr lang="en-GB" dirty="0"/>
+              <a:t>Three options (for demonstrators!)</a:t>
+            </a:r>
+          </a:p>
+          <a:p>
+            <a:pPr lvl="1"/>
+            <a:r>
+              <a:rPr lang="en-GB" dirty="0"/>
+              <a:t>Signoff</a:t>
+            </a:r>
+          </a:p>
+          <a:p>
+            <a:pPr lvl="1"/>
+            <a:r>
+              <a:rPr lang="en-GB" dirty="0"/>
+              <a:t>Queueing (students can add themselves to a queue for signoff).</a:t>
+            </a:r>
+          </a:p>
+          <a:p>
+            <a:pPr lvl="1"/>
+            <a:r>
+              <a:rPr lang="en-GB" dirty="0"/>
+              <a:t>Instructions</a:t>
+            </a:r>
+          </a:p>
+          <a:p>
+            <a:pPr marL="0" indent="0">
+              <a:buNone/>
+            </a:pPr>
+            <a:endParaRPr lang="en-GB" dirty="0"/>
+          </a:p>
+        </p:txBody>
+      </p:sp>
     </p:spTree>
     <p:extLst>
       <p:ext uri="{BB962C8B-B14F-4D97-AF65-F5344CB8AC3E}">
-        <p14:creationId xmlns:p14="http://schemas.microsoft.com/office/powerpoint/2010/main" val="3892910494"/>
+        <p14:creationId xmlns:p14="http://schemas.microsoft.com/office/powerpoint/2010/main" val="3148399099"/>
       </p:ext>
     </p:extLst>
   </p:cSld>
@@ -5969,7 +6076,7 @@
 
 <file path=ppt/tags/tag1.xml><?xml version="1.0" encoding="utf-8"?>
 <p:tagLst xmlns:a="http://schemas.openxmlformats.org/drawingml/2006/main" xmlns:r="http://schemas.openxmlformats.org/officeDocument/2006/relationships" xmlns:p="http://schemas.openxmlformats.org/presentationml/2006/main">
-  <p:tag name="PRESGUID" val="003e92f7-6c68-4aa4-95ab-46bebddf22b0"/>
+  <p:tag name="PRESGUID" val="1a906974-1c05-46e8-9961-a17534c31c6b"/>
 </p:tagLst>
 </file>
 
@@ -6457,13 +6564,13 @@
 <file path=customXml/itemProps1.xml><?xml version="1.0" encoding="utf-8"?>
 <ds:datastoreItem xmlns:ds="http://schemas.openxmlformats.org/officeDocument/2006/customXml" ds:itemID="{B182822E-3179-497E-8964-1C0779B53339}">
   <ds:schemaRefs>
+    <ds:schemaRef ds:uri="c4c4e6c1-1580-457f-8034-c126c8dee3c7"/>
+    <ds:schemaRef ds:uri="http://schemas.openxmlformats.org/package/2006/metadata/core-properties"/>
     <ds:schemaRef ds:uri="http://schemas.microsoft.com/office/2006/documentManagement/types"/>
+    <ds:schemaRef ds:uri="http://schemas.microsoft.com/office/2006/metadata/properties"/>
+    <ds:schemaRef ds:uri="http://purl.org/dc/elements/1.1/"/>
     <ds:schemaRef ds:uri="http://purl.org/dc/terms/"/>
     <ds:schemaRef ds:uri="http://schemas.microsoft.com/office/infopath/2007/PartnerControls"/>
-    <ds:schemaRef ds:uri="http://schemas.microsoft.com/office/2006/metadata/properties"/>
-    <ds:schemaRef ds:uri="http://purl.org/dc/elements/1.1/"/>
-    <ds:schemaRef ds:uri="http://schemas.openxmlformats.org/package/2006/metadata/core-properties"/>
-    <ds:schemaRef ds:uri="c4c4e6c1-1580-457f-8034-c126c8dee3c7"/>
     <ds:schemaRef ds:uri="http://www.w3.org/XML/1998/namespace"/>
     <ds:schemaRef ds:uri="http://purl.org/dc/dcmitype/"/>
   </ds:schemaRefs>

</xml_diff>

<commit_message>
Updated demonstrator worksheet practices
</commit_message>
<xml_diff>
--- a/static/downloads/dem.pptx
+++ b/static/downloads/dem.pptx
@@ -5,7 +5,7 @@
     <p:sldMasterId id="2147483648" r:id="rId4"/>
   </p:sldMasterIdLst>
   <p:notesMasterIdLst>
-    <p:notesMasterId r:id="rId41"/>
+    <p:notesMasterId r:id="rId42"/>
   </p:notesMasterIdLst>
   <p:sldIdLst>
     <p:sldId id="256" r:id="rId5"/>
@@ -38,17 +38,18 @@
     <p:sldId id="330" r:id="rId32"/>
     <p:sldId id="338" r:id="rId33"/>
     <p:sldId id="337" r:id="rId34"/>
-    <p:sldId id="288" r:id="rId35"/>
-    <p:sldId id="331" r:id="rId36"/>
-    <p:sldId id="285" r:id="rId37"/>
-    <p:sldId id="300" r:id="rId38"/>
-    <p:sldId id="314" r:id="rId39"/>
-    <p:sldId id="286" r:id="rId40"/>
+    <p:sldId id="339" r:id="rId35"/>
+    <p:sldId id="288" r:id="rId36"/>
+    <p:sldId id="331" r:id="rId37"/>
+    <p:sldId id="285" r:id="rId38"/>
+    <p:sldId id="300" r:id="rId39"/>
+    <p:sldId id="314" r:id="rId40"/>
+    <p:sldId id="286" r:id="rId41"/>
   </p:sldIdLst>
   <p:sldSz cx="9144000" cy="6858000" type="screen4x3"/>
   <p:notesSz cx="6797675" cy="9926638"/>
   <p:custDataLst>
-    <p:tags r:id="rId42"/>
+    <p:tags r:id="rId43"/>
   </p:custDataLst>
   <p:defaultTextStyle>
     <a:defPPr>
@@ -170,9 +171,91 @@
 <file path=ppt/revisionInfo.xml><?xml version="1.0" encoding="utf-8"?>
 <p1510:revInfo xmlns:a="http://schemas.openxmlformats.org/drawingml/2006/main" xmlns:r="http://schemas.openxmlformats.org/officeDocument/2006/relationships" xmlns:p1510="http://schemas.microsoft.com/office/powerpoint/2015/10/main">
   <p1510:revLst>
-    <p1510:client id="{155B7D8C-9164-4EC3-A0CA-14DD46E39129}" v="138" dt="2024-09-25T10:35:15.314"/>
+    <p1510:client id="{E2E59770-B7CC-4191-9A36-288E3436FBFF}" v="3" dt="2025-10-01T10:34:39.308"/>
   </p1510:revLst>
 </p1510:revInfo>
+</file>
+
+<file path=ppt/changesInfos/changesInfo1.xml><?xml version="1.0" encoding="utf-8"?>
+<pc:chgInfo xmlns:a="http://schemas.openxmlformats.org/drawingml/2006/main" xmlns:r="http://schemas.openxmlformats.org/officeDocument/2006/relationships" xmlns:ac="http://schemas.microsoft.com/office/drawing/2013/main/command" xmlns:pc="http://schemas.microsoft.com/office/powerpoint/2013/main/command">
+  <pc:docChgLst>
+    <pc:chgData name="James Finnis [jcf12] (Staff)" userId="faeb6a00-5959-429b-8da1-bc8a866eba94" providerId="ADAL" clId="{E2E59770-B7CC-4191-9A36-288E3436FBFF}"/>
+    <pc:docChg chg="undo custSel addSld modSld">
+      <pc:chgData name="James Finnis [jcf12] (Staff)" userId="faeb6a00-5959-429b-8da1-bc8a866eba94" providerId="ADAL" clId="{E2E59770-B7CC-4191-9A36-288E3436FBFF}" dt="2025-10-01T10:37:06.583" v="974" actId="20577"/>
+      <pc:docMkLst>
+        <pc:docMk/>
+      </pc:docMkLst>
+      <pc:sldChg chg="modSp mod">
+        <pc:chgData name="James Finnis [jcf12] (Staff)" userId="faeb6a00-5959-429b-8da1-bc8a866eba94" providerId="ADAL" clId="{E2E59770-B7CC-4191-9A36-288E3436FBFF}" dt="2025-09-30T16:23:14.852" v="2" actId="20577"/>
+        <pc:sldMkLst>
+          <pc:docMk/>
+          <pc:sldMk cId="0" sldId="256"/>
+        </pc:sldMkLst>
+        <pc:spChg chg="mod">
+          <ac:chgData name="James Finnis [jcf12] (Staff)" userId="faeb6a00-5959-429b-8da1-bc8a866eba94" providerId="ADAL" clId="{E2E59770-B7CC-4191-9A36-288E3436FBFF}" dt="2025-09-30T16:23:14.852" v="2" actId="20577"/>
+          <ac:spMkLst>
+            <pc:docMk/>
+            <pc:sldMk cId="0" sldId="256"/>
+            <ac:spMk id="2" creationId="{00000000-0000-0000-0000-000000000000}"/>
+          </ac:spMkLst>
+        </pc:spChg>
+      </pc:sldChg>
+      <pc:sldChg chg="modSp mod">
+        <pc:chgData name="James Finnis [jcf12] (Staff)" userId="faeb6a00-5959-429b-8da1-bc8a866eba94" providerId="ADAL" clId="{E2E59770-B7CC-4191-9A36-288E3436FBFF}" dt="2025-09-30T16:24:04.260" v="72" actId="20577"/>
+        <pc:sldMkLst>
+          <pc:docMk/>
+          <pc:sldMk cId="1743725458" sldId="332"/>
+        </pc:sldMkLst>
+        <pc:spChg chg="mod">
+          <ac:chgData name="James Finnis [jcf12] (Staff)" userId="faeb6a00-5959-429b-8da1-bc8a866eba94" providerId="ADAL" clId="{E2E59770-B7CC-4191-9A36-288E3436FBFF}" dt="2025-09-30T16:24:04.260" v="72" actId="20577"/>
+          <ac:spMkLst>
+            <pc:docMk/>
+            <pc:sldMk cId="1743725458" sldId="332"/>
+            <ac:spMk id="3" creationId="{00000000-0000-0000-0000-000000000000}"/>
+          </ac:spMkLst>
+        </pc:spChg>
+      </pc:sldChg>
+      <pc:sldChg chg="modSp mod">
+        <pc:chgData name="James Finnis [jcf12] (Staff)" userId="faeb6a00-5959-429b-8da1-bc8a866eba94" providerId="ADAL" clId="{E2E59770-B7CC-4191-9A36-288E3436FBFF}" dt="2025-09-30T16:24:37.729" v="164" actId="20577"/>
+        <pc:sldMkLst>
+          <pc:docMk/>
+          <pc:sldMk cId="4252872086" sldId="334"/>
+        </pc:sldMkLst>
+        <pc:spChg chg="mod">
+          <ac:chgData name="James Finnis [jcf12] (Staff)" userId="faeb6a00-5959-429b-8da1-bc8a866eba94" providerId="ADAL" clId="{E2E59770-B7CC-4191-9A36-288E3436FBFF}" dt="2025-09-30T16:24:37.729" v="164" actId="20577"/>
+          <ac:spMkLst>
+            <pc:docMk/>
+            <pc:sldMk cId="4252872086" sldId="334"/>
+            <ac:spMk id="3" creationId="{00000000-0000-0000-0000-000000000000}"/>
+          </ac:spMkLst>
+        </pc:spChg>
+      </pc:sldChg>
+      <pc:sldChg chg="modSp add mod">
+        <pc:chgData name="James Finnis [jcf12] (Staff)" userId="faeb6a00-5959-429b-8da1-bc8a866eba94" providerId="ADAL" clId="{E2E59770-B7CC-4191-9A36-288E3436FBFF}" dt="2025-10-01T10:37:06.583" v="974" actId="20577"/>
+        <pc:sldMkLst>
+          <pc:docMk/>
+          <pc:sldMk cId="656990717" sldId="339"/>
+        </pc:sldMkLst>
+        <pc:spChg chg="mod">
+          <ac:chgData name="James Finnis [jcf12] (Staff)" userId="faeb6a00-5959-429b-8da1-bc8a866eba94" providerId="ADAL" clId="{E2E59770-B7CC-4191-9A36-288E3436FBFF}" dt="2025-10-01T10:34:12.203" v="839" actId="313"/>
+          <ac:spMkLst>
+            <pc:docMk/>
+            <pc:sldMk cId="656990717" sldId="339"/>
+            <ac:spMk id="2" creationId="{41FFDF29-728A-CBC5-2E7C-823A7A925ADB}"/>
+          </ac:spMkLst>
+        </pc:spChg>
+        <pc:spChg chg="mod">
+          <ac:chgData name="James Finnis [jcf12] (Staff)" userId="faeb6a00-5959-429b-8da1-bc8a866eba94" providerId="ADAL" clId="{E2E59770-B7CC-4191-9A36-288E3436FBFF}" dt="2025-10-01T10:37:06.583" v="974" actId="20577"/>
+          <ac:spMkLst>
+            <pc:docMk/>
+            <pc:sldMk cId="656990717" sldId="339"/>
+            <ac:spMk id="3" creationId="{EDAFEE3C-FA31-AA88-EAC7-1D3E7833B2FA}"/>
+          </ac:spMkLst>
+        </pc:spChg>
+      </pc:sldChg>
+    </pc:docChg>
+  </pc:docChgLst>
+</pc:chgInfo>
 </file>
 
 <file path=ppt/notesMasters/notesMaster1.xml><?xml version="1.0" encoding="utf-8"?>
@@ -257,7 +340,7 @@
           <a:p>
             <a:fld id="{9577E772-4335-40B3-8D99-5219908BCAF5}" type="datetimeFigureOut">
               <a:rPr lang="en-GB" smtClean="0"/>
-              <a:t>02/10/2024</a:t>
+              <a:t>01/10/2025</a:t>
             </a:fld>
             <a:endParaRPr lang="en-GB"/>
           </a:p>
@@ -1054,7 +1137,7 @@
           <a:p>
             <a:fld id="{E6E61A80-AD3E-5043-BBBB-DD0D35B177C1}" type="datetimeFigureOut">
               <a:rPr lang="en-US" smtClean="0"/>
-              <a:t>10/2/2024</a:t>
+              <a:t>10/1/2025</a:t>
             </a:fld>
             <a:endParaRPr lang="en-US"/>
           </a:p>
@@ -1219,7 +1302,7 @@
           <a:p>
             <a:fld id="{E6E61A80-AD3E-5043-BBBB-DD0D35B177C1}" type="datetimeFigureOut">
               <a:rPr lang="en-US" smtClean="0"/>
-              <a:t>10/2/2024</a:t>
+              <a:t>10/1/2025</a:t>
             </a:fld>
             <a:endParaRPr lang="en-US"/>
           </a:p>
@@ -1394,7 +1477,7 @@
           <a:p>
             <a:fld id="{E6E61A80-AD3E-5043-BBBB-DD0D35B177C1}" type="datetimeFigureOut">
               <a:rPr lang="en-US" smtClean="0"/>
-              <a:t>10/2/2024</a:t>
+              <a:t>10/1/2025</a:t>
             </a:fld>
             <a:endParaRPr lang="en-US"/>
           </a:p>
@@ -1559,7 +1642,7 @@
           <a:p>
             <a:fld id="{E6E61A80-AD3E-5043-BBBB-DD0D35B177C1}" type="datetimeFigureOut">
               <a:rPr lang="en-US" smtClean="0"/>
-              <a:t>10/2/2024</a:t>
+              <a:t>10/1/2025</a:t>
             </a:fld>
             <a:endParaRPr lang="en-US"/>
           </a:p>
@@ -1800,7 +1883,7 @@
           <a:p>
             <a:fld id="{E6E61A80-AD3E-5043-BBBB-DD0D35B177C1}" type="datetimeFigureOut">
               <a:rPr lang="en-US" smtClean="0"/>
-              <a:t>10/2/2024</a:t>
+              <a:t>10/1/2025</a:t>
             </a:fld>
             <a:endParaRPr lang="en-US"/>
           </a:p>
@@ -2083,7 +2166,7 @@
           <a:p>
             <a:fld id="{E6E61A80-AD3E-5043-BBBB-DD0D35B177C1}" type="datetimeFigureOut">
               <a:rPr lang="en-US" smtClean="0"/>
-              <a:t>10/2/2024</a:t>
+              <a:t>10/1/2025</a:t>
             </a:fld>
             <a:endParaRPr lang="en-US"/>
           </a:p>
@@ -2500,7 +2583,7 @@
           <a:p>
             <a:fld id="{E6E61A80-AD3E-5043-BBBB-DD0D35B177C1}" type="datetimeFigureOut">
               <a:rPr lang="en-US" smtClean="0"/>
-              <a:t>10/2/2024</a:t>
+              <a:t>10/1/2025</a:t>
             </a:fld>
             <a:endParaRPr lang="en-US"/>
           </a:p>
@@ -2613,7 +2696,7 @@
           <a:p>
             <a:fld id="{E6E61A80-AD3E-5043-BBBB-DD0D35B177C1}" type="datetimeFigureOut">
               <a:rPr lang="en-US" smtClean="0"/>
-              <a:t>10/2/2024</a:t>
+              <a:t>10/1/2025</a:t>
             </a:fld>
             <a:endParaRPr lang="en-US"/>
           </a:p>
@@ -2703,7 +2786,7 @@
           <a:p>
             <a:fld id="{E6E61A80-AD3E-5043-BBBB-DD0D35B177C1}" type="datetimeFigureOut">
               <a:rPr lang="en-US" smtClean="0"/>
-              <a:t>10/2/2024</a:t>
+              <a:t>10/1/2025</a:t>
             </a:fld>
             <a:endParaRPr lang="en-US"/>
           </a:p>
@@ -2975,7 +3058,7 @@
           <a:p>
             <a:fld id="{E6E61A80-AD3E-5043-BBBB-DD0D35B177C1}" type="datetimeFigureOut">
               <a:rPr lang="en-US" smtClean="0"/>
-              <a:t>10/2/2024</a:t>
+              <a:t>10/1/2025</a:t>
             </a:fld>
             <a:endParaRPr lang="en-US"/>
           </a:p>
@@ -3223,7 +3306,7 @@
           <a:p>
             <a:fld id="{E6E61A80-AD3E-5043-BBBB-DD0D35B177C1}" type="datetimeFigureOut">
               <a:rPr lang="en-US" smtClean="0"/>
-              <a:t>10/2/2024</a:t>
+              <a:t>10/1/2025</a:t>
             </a:fld>
             <a:endParaRPr lang="en-US"/>
           </a:p>
@@ -3431,7 +3514,7 @@
           <a:p>
             <a:fld id="{E6E61A80-AD3E-5043-BBBB-DD0D35B177C1}" type="datetimeFigureOut">
               <a:rPr lang="en-US" smtClean="0"/>
-              <a:t>10/2/2024</a:t>
+              <a:t>10/1/2025</a:t>
             </a:fld>
             <a:endParaRPr lang="en-US"/>
           </a:p>
@@ -3821,7 +3904,7 @@
         <p:spPr>
           <a:xfrm>
             <a:off x="755576" y="1412776"/>
-            <a:ext cx="7776864" cy="5016758"/>
+            <a:ext cx="7776864" cy="4462760"/>
           </a:xfrm>
           <a:prstGeom prst="rect">
             <a:avLst/>
@@ -3854,7 +3937,7 @@
             <a:pPr algn="ctr"/>
             <a:r>
               <a:rPr lang="en-GB" sz="3600" b="1" dirty="0"/>
-              <a:t>October 2024</a:t>
+              <a:t>October 2025</a:t>
             </a:r>
           </a:p>
           <a:p>
@@ -3866,13 +3949,6 @@
             <a:r>
               <a:rPr lang="en-GB" sz="3600" b="1" dirty="0"/>
               <a:t>Jim Finnis</a:t>
-            </a:r>
-          </a:p>
-          <a:p>
-            <a:pPr algn="ctr"/>
-            <a:r>
-              <a:rPr lang="en-GB" sz="3600" b="1" dirty="0"/>
-              <a:t>Alan Macmillan</a:t>
             </a:r>
           </a:p>
           <a:p>
@@ -4762,13 +4838,8 @@
             </a:r>
             <a:r>
               <a:rPr lang="en-GB" sz="2800" dirty="0"/>
-              <a:t> to </a:t>
-            </a:r>
-            <a:r>
-              <a:rPr lang="en-GB" sz="2800" dirty="0" err="1"/>
-              <a:t>Glenwen</a:t>
-            </a:r>
-            <a:endParaRPr lang="en-GB" sz="2800" dirty="0"/>
+              <a:t> to Academic Operations (for the attention of Glenwen Morgans)</a:t>
+            </a:r>
           </a:p>
           <a:p>
             <a:r>
@@ -5006,20 +5077,23 @@
           <a:p>
             <a:pPr lvl="1"/>
             <a:r>
-              <a:rPr lang="en-GB" sz="2400" dirty="0" err="1"/>
-              <a:t>Glenwen</a:t>
-            </a:r>
-            <a:r>
               <a:rPr lang="en-GB" sz="2400" dirty="0"/>
-              <a:t> Morgans </a:t>
+              <a:t>Academic Operations </a:t>
             </a:r>
             <a:r>
               <a:rPr lang="en-GB" sz="2400" dirty="0">
                 <a:hlinkClick r:id="rId3"/>
               </a:rPr>
-              <a:t>gsm@aber.ac.uk</a:t>
+              <a:t>acadops@aber.ac.uk</a:t>
             </a:r>
             <a:endParaRPr lang="en-GB" sz="2400" dirty="0"/>
+          </a:p>
+          <a:p>
+            <a:pPr lvl="1"/>
+            <a:r>
+              <a:rPr lang="en-GB" sz="2400" dirty="0"/>
+              <a:t>Mark “FAO: Glenwen Morgans” (it’s a shared address)</a:t>
+            </a:r>
           </a:p>
           <a:p>
             <a:r>
@@ -6944,6 +7018,200 @@
 </file>
 
 <file path=ppt/slides/slide31.xml><?xml version="1.0" encoding="utf-8"?>
+<p:sld xmlns:a="http://schemas.openxmlformats.org/drawingml/2006/main" xmlns:r="http://schemas.openxmlformats.org/officeDocument/2006/relationships" xmlns:p="http://schemas.openxmlformats.org/presentationml/2006/main">
+  <p:cSld>
+    <p:bg>
+      <p:bgPr>
+        <a:blipFill rotWithShape="1">
+          <a:blip r:embed="rId2"/>
+          <a:stretch>
+            <a:fillRect/>
+          </a:stretch>
+        </a:blipFill>
+        <a:effectLst/>
+      </p:bgPr>
+    </p:bg>
+    <p:spTree>
+      <p:nvGrpSpPr>
+        <p:cNvPr id="1" name="">
+          <a:extLst>
+            <a:ext uri="{FF2B5EF4-FFF2-40B4-BE49-F238E27FC236}">
+              <a16:creationId xmlns:a16="http://schemas.microsoft.com/office/drawing/2014/main" id="{E8F31AD1-71E9-8FAA-7BB6-A1839D8625CB}"/>
+            </a:ext>
+          </a:extLst>
+        </p:cNvPr>
+        <p:cNvGrpSpPr/>
+        <p:nvPr/>
+      </p:nvGrpSpPr>
+      <p:grpSpPr>
+        <a:xfrm>
+          <a:off x="0" y="0"/>
+          <a:ext cx="0" cy="0"/>
+          <a:chOff x="0" y="0"/>
+          <a:chExt cx="0" cy="0"/>
+        </a:xfrm>
+      </p:grpSpPr>
+      <p:sp>
+        <p:nvSpPr>
+          <p:cNvPr id="2" name="Title 1">
+            <a:extLst>
+              <a:ext uri="{FF2B5EF4-FFF2-40B4-BE49-F238E27FC236}">
+                <a16:creationId xmlns:a16="http://schemas.microsoft.com/office/drawing/2014/main" id="{41FFDF29-728A-CBC5-2E7C-823A7A925ADB}"/>
+              </a:ext>
+            </a:extLst>
+          </p:cNvPr>
+          <p:cNvSpPr>
+            <a:spLocks noGrp="1"/>
+          </p:cNvSpPr>
+          <p:nvPr>
+            <p:ph type="title"/>
+          </p:nvPr>
+        </p:nvSpPr>
+        <p:spPr>
+          <a:xfrm>
+            <a:off x="457200" y="274638"/>
+            <a:ext cx="8229600" cy="634082"/>
+          </a:xfrm>
+        </p:spPr>
+        <p:txBody>
+          <a:bodyPr>
+            <a:normAutofit fontScale="90000"/>
+          </a:bodyPr>
+          <a:lstStyle/>
+          <a:p>
+            <a:br>
+              <a:rPr lang="en-GB" dirty="0"/>
+            </a:br>
+            <a:br>
+              <a:rPr lang="en-GB" dirty="0"/>
+            </a:br>
+            <a:r>
+              <a:rPr lang="en-GB" dirty="0"/>
+              <a:t>“</a:t>
+            </a:r>
+            <a:r>
+              <a:rPr lang="en-GB" b="1" dirty="0"/>
+              <a:t>AI”</a:t>
+            </a:r>
+          </a:p>
+        </p:txBody>
+      </p:sp>
+      <p:sp>
+        <p:nvSpPr>
+          <p:cNvPr id="3" name="Content Placeholder 2">
+            <a:extLst>
+              <a:ext uri="{FF2B5EF4-FFF2-40B4-BE49-F238E27FC236}">
+                <a16:creationId xmlns:a16="http://schemas.microsoft.com/office/drawing/2014/main" id="{EDAFEE3C-FA31-AA88-EAC7-1D3E7833B2FA}"/>
+              </a:ext>
+            </a:extLst>
+          </p:cNvPr>
+          <p:cNvSpPr>
+            <a:spLocks noGrp="1"/>
+          </p:cNvSpPr>
+          <p:nvPr>
+            <p:ph idx="1"/>
+          </p:nvPr>
+        </p:nvSpPr>
+        <p:spPr/>
+        <p:txBody>
+          <a:bodyPr>
+            <a:normAutofit lnSpcReduction="10000"/>
+          </a:bodyPr>
+          <a:lstStyle/>
+          <a:p>
+            <a:r>
+              <a:rPr lang="en-GB" sz="2400" dirty="0"/>
+              <a:t>(in the form of </a:t>
+            </a:r>
+            <a:r>
+              <a:rPr lang="en-GB" sz="2400"/>
+              <a:t>Generative AI / Large </a:t>
+            </a:r>
+            <a:r>
+              <a:rPr lang="en-GB" sz="2400" dirty="0"/>
+              <a:t>Language Models)</a:t>
+            </a:r>
+          </a:p>
+          <a:p>
+            <a:r>
+              <a:rPr lang="en-GB" sz="2400" dirty="0"/>
+              <a:t>If you see a student using an LLM make sure</a:t>
+            </a:r>
+          </a:p>
+          <a:p>
+            <a:pPr lvl="1"/>
+            <a:r>
+              <a:rPr lang="en-GB" sz="2000" dirty="0"/>
+              <a:t>They are aware that LLMs aren’t a database of facts, they’re a statistical model of the most likely way to complete a prompt given a big, blurry snapshot of the internet and loads of books.</a:t>
+            </a:r>
+          </a:p>
+          <a:p>
+            <a:pPr lvl="1"/>
+            <a:r>
+              <a:rPr lang="en-GB" sz="2000" dirty="0"/>
+              <a:t>The internet is full of lies. The LLM doesn’t know the difference.</a:t>
+            </a:r>
+          </a:p>
+          <a:p>
+            <a:pPr lvl="1"/>
+            <a:r>
+              <a:rPr lang="en-GB" sz="2000" dirty="0"/>
+              <a:t>The blurry nature of the snapshot means it’s very far from perfect.</a:t>
+            </a:r>
+          </a:p>
+          <a:p>
+            <a:r>
+              <a:rPr lang="en-GB" sz="2400" dirty="0"/>
+              <a:t>They should be able to understand and explain what the LLM is telling them.</a:t>
+            </a:r>
+          </a:p>
+          <a:p>
+            <a:r>
+              <a:rPr lang="en-GB" sz="2400" b="1" dirty="0"/>
+              <a:t>Otherwise, they aren’t learning.</a:t>
+            </a:r>
+          </a:p>
+          <a:p>
+            <a:r>
+              <a:rPr lang="en-GB" sz="2400" dirty="0"/>
+              <a:t>Blackboard course on generative AI and using it ethically:</a:t>
+            </a:r>
+          </a:p>
+          <a:p>
+            <a:pPr lvl="1"/>
+            <a:r>
+              <a:rPr lang="en-GB" sz="1800" dirty="0">
+                <a:hlinkClick r:id="rId3"/>
+              </a:rPr>
+              <a:t>https://blackboard.aber.ac.uk/ultra/organizations/_54998_1/outline</a:t>
+            </a:r>
+            <a:endParaRPr lang="en-GB" sz="1800" dirty="0"/>
+          </a:p>
+          <a:p>
+            <a:endParaRPr lang="en-GB" sz="2400" dirty="0"/>
+          </a:p>
+          <a:p>
+            <a:pPr marL="0" indent="0">
+              <a:buNone/>
+            </a:pPr>
+            <a:endParaRPr lang="en-GB" sz="2400" dirty="0"/>
+          </a:p>
+        </p:txBody>
+      </p:sp>
+    </p:spTree>
+    <p:extLst>
+      <p:ext uri="{BB962C8B-B14F-4D97-AF65-F5344CB8AC3E}">
+        <p14:creationId xmlns:p14="http://schemas.microsoft.com/office/powerpoint/2010/main" val="656990717"/>
+      </p:ext>
+    </p:extLst>
+  </p:cSld>
+  <p:clrMapOvr>
+    <a:masterClrMapping/>
+  </p:clrMapOvr>
+</p:sld>
+</file>
+
+<file path=ppt/slides/slide32.xml><?xml version="1.0" encoding="utf-8"?>
 <p:sld xmlns:a="http://schemas.openxmlformats.org/drawingml/2006/main" xmlns:r="http://schemas.openxmlformats.org/officeDocument/2006/relationships" xmlns:p="http://schemas.openxmlformats.org/presentationml/2006/main">
   <p:cSld>
     <p:bg>
@@ -7132,120 +7400,6 @@
 </p:sld>
 </file>
 
-<file path=ppt/slides/slide32.xml><?xml version="1.0" encoding="utf-8"?>
-<p:sld xmlns:a="http://schemas.openxmlformats.org/drawingml/2006/main" xmlns:r="http://schemas.openxmlformats.org/officeDocument/2006/relationships" xmlns:p="http://schemas.openxmlformats.org/presentationml/2006/main">
-  <p:cSld>
-    <p:bg>
-      <p:bgPr>
-        <a:blipFill rotWithShape="1">
-          <a:blip r:embed="rId2"/>
-          <a:stretch>
-            <a:fillRect/>
-          </a:stretch>
-        </a:blipFill>
-        <a:effectLst/>
-      </p:bgPr>
-    </p:bg>
-    <p:spTree>
-      <p:nvGrpSpPr>
-        <p:cNvPr id="1" name=""/>
-        <p:cNvGrpSpPr/>
-        <p:nvPr/>
-      </p:nvGrpSpPr>
-      <p:grpSpPr>
-        <a:xfrm>
-          <a:off x="0" y="0"/>
-          <a:ext cx="0" cy="0"/>
-          <a:chOff x="0" y="0"/>
-          <a:chExt cx="0" cy="0"/>
-        </a:xfrm>
-      </p:grpSpPr>
-      <p:sp>
-        <p:nvSpPr>
-          <p:cNvPr id="2" name="Title 1"/>
-          <p:cNvSpPr>
-            <a:spLocks noGrp="1"/>
-          </p:cNvSpPr>
-          <p:nvPr>
-            <p:ph type="title"/>
-          </p:nvPr>
-        </p:nvSpPr>
-        <p:spPr>
-          <a:xfrm>
-            <a:off x="457200" y="274638"/>
-            <a:ext cx="8229600" cy="634082"/>
-          </a:xfrm>
-        </p:spPr>
-        <p:txBody>
-          <a:bodyPr>
-            <a:normAutofit fontScale="90000"/>
-          </a:bodyPr>
-          <a:lstStyle/>
-          <a:p>
-            <a:br>
-              <a:rPr lang="en-GB" dirty="0"/>
-            </a:br>
-            <a:br>
-              <a:rPr lang="en-GB" dirty="0"/>
-            </a:br>
-            <a:r>
-              <a:rPr lang="en-GB" b="1" dirty="0"/>
-              <a:t>Good for you too!</a:t>
-            </a:r>
-          </a:p>
-        </p:txBody>
-      </p:sp>
-      <p:sp>
-        <p:nvSpPr>
-          <p:cNvPr id="3" name="Content Placeholder 2"/>
-          <p:cNvSpPr>
-            <a:spLocks noGrp="1"/>
-          </p:cNvSpPr>
-          <p:nvPr>
-            <p:ph idx="1"/>
-          </p:nvPr>
-        </p:nvSpPr>
-        <p:spPr/>
-        <p:txBody>
-          <a:bodyPr>
-            <a:normAutofit/>
-          </a:bodyPr>
-          <a:lstStyle/>
-          <a:p>
-            <a:r>
-              <a:rPr lang="en-GB" dirty="0"/>
-              <a:t>This is a great opportunity for you to learn</a:t>
-            </a:r>
-          </a:p>
-          <a:p>
-            <a:pPr lvl="1"/>
-            <a:r>
-              <a:rPr lang="en-GB" dirty="0"/>
-              <a:t>Technical stuff</a:t>
-            </a:r>
-          </a:p>
-          <a:p>
-            <a:pPr lvl="1"/>
-            <a:r>
-              <a:rPr lang="en-GB" dirty="0"/>
-              <a:t>How to explain things</a:t>
-            </a:r>
-          </a:p>
-        </p:txBody>
-      </p:sp>
-    </p:spTree>
-    <p:extLst>
-      <p:ext uri="{BB962C8B-B14F-4D97-AF65-F5344CB8AC3E}">
-        <p14:creationId xmlns:p14="http://schemas.microsoft.com/office/powerpoint/2010/main" val="3752275959"/>
-      </p:ext>
-    </p:extLst>
-  </p:cSld>
-  <p:clrMapOvr>
-    <a:masterClrMapping/>
-  </p:clrMapOvr>
-</p:sld>
-</file>
-
 <file path=ppt/slides/slide33.xml><?xml version="1.0" encoding="utf-8"?>
 <p:sld xmlns:a="http://schemas.openxmlformats.org/drawingml/2006/main" xmlns:r="http://schemas.openxmlformats.org/officeDocument/2006/relationships" xmlns:p="http://schemas.openxmlformats.org/presentationml/2006/main">
   <p:cSld>
@@ -7284,7 +7438,12 @@
             <p:ph type="title"/>
           </p:nvPr>
         </p:nvSpPr>
-        <p:spPr/>
+        <p:spPr>
+          <a:xfrm>
+            <a:off x="457200" y="274638"/>
+            <a:ext cx="8229600" cy="634082"/>
+          </a:xfrm>
+        </p:spPr>
         <p:txBody>
           <a:bodyPr>
             <a:normAutofit fontScale="90000"/>
@@ -7299,7 +7458,7 @@
             </a:br>
             <a:r>
               <a:rPr lang="en-GB" b="1" dirty="0"/>
-              <a:t>End of session</a:t>
+              <a:t>Good for you too!</a:t>
             </a:r>
           </a:p>
         </p:txBody>
@@ -7321,39 +7480,31 @@
           </a:bodyPr>
           <a:lstStyle/>
           <a:p>
-            <a:pPr marL="0" lvl="0" indent="0">
-              <a:buNone/>
-            </a:pPr>
-            <a:endParaRPr lang="en-GB" sz="2800" dirty="0"/>
-          </a:p>
-          <a:p>
-            <a:pPr lvl="0"/>
-            <a:r>
-              <a:rPr lang="en-GB" sz="2800" dirty="0"/>
-              <a:t>Try to make sure student work is reasonable before sign-off</a:t>
-            </a:r>
-          </a:p>
-          <a:p>
-            <a:r>
-              <a:rPr lang="en-GB" sz="2800" dirty="0"/>
-              <a:t>You need to know what the requirements are</a:t>
-            </a:r>
-          </a:p>
-          <a:p>
-            <a:r>
-              <a:rPr lang="en-GB" sz="2800" dirty="0"/>
-              <a:t>Feedback any issues to module coordinator</a:t>
-            </a:r>
-          </a:p>
-          <a:p>
-            <a:endParaRPr lang="en-GB" sz="2800" dirty="0"/>
+            <a:r>
+              <a:rPr lang="en-GB" dirty="0"/>
+              <a:t>This is a great opportunity for you to learn</a:t>
+            </a:r>
+          </a:p>
+          <a:p>
+            <a:pPr lvl="1"/>
+            <a:r>
+              <a:rPr lang="en-GB" dirty="0"/>
+              <a:t>Technical stuff</a:t>
+            </a:r>
+          </a:p>
+          <a:p>
+            <a:pPr lvl="1"/>
+            <a:r>
+              <a:rPr lang="en-GB" dirty="0"/>
+              <a:t>How to explain things</a:t>
+            </a:r>
           </a:p>
         </p:txBody>
       </p:sp>
     </p:spTree>
     <p:extLst>
       <p:ext uri="{BB962C8B-B14F-4D97-AF65-F5344CB8AC3E}">
-        <p14:creationId xmlns:p14="http://schemas.microsoft.com/office/powerpoint/2010/main" val="4244559619"/>
+        <p14:creationId xmlns:p14="http://schemas.microsoft.com/office/powerpoint/2010/main" val="3752275959"/>
       </p:ext>
     </p:extLst>
   </p:cSld>
@@ -7409,14 +7560,14 @@
           <a:lstStyle/>
           <a:p>
             <a:br>
-              <a:rPr lang="en-GB" u="sng" dirty="0"/>
+              <a:rPr lang="en-GB" dirty="0"/>
             </a:br>
             <a:br>
-              <a:rPr lang="en-GB" u="sng" dirty="0"/>
+              <a:rPr lang="en-GB" dirty="0"/>
             </a:br>
             <a:r>
-              <a:rPr lang="en-GB" b="1" u="sng" dirty="0"/>
-              <a:t>Please turn up.</a:t>
+              <a:rPr lang="en-GB" b="1" dirty="0"/>
+              <a:t>End of session</a:t>
             </a:r>
           </a:p>
         </p:txBody>
@@ -7431,54 +7582,46 @@
             <p:ph idx="1"/>
           </p:nvPr>
         </p:nvSpPr>
-        <p:spPr>
-          <a:xfrm>
-            <a:off x="457200" y="1772816"/>
-            <a:ext cx="8229600" cy="4353347"/>
-          </a:xfrm>
-        </p:spPr>
+        <p:spPr/>
         <p:txBody>
           <a:bodyPr>
             <a:normAutofit/>
           </a:bodyPr>
           <a:lstStyle/>
           <a:p>
+            <a:pPr marL="0" lvl="0" indent="0">
+              <a:buNone/>
+            </a:pPr>
+            <a:endParaRPr lang="en-GB" sz="2800" dirty="0"/>
+          </a:p>
+          <a:p>
+            <a:pPr lvl="0"/>
             <a:r>
               <a:rPr lang="en-GB" sz="2800" dirty="0"/>
-              <a:t>If you don’t come to a session you’re supposed to attend, it puts an unfair load on the other demonstrators and the lecturer.</a:t>
+              <a:t>Try to make sure student work is reasonable before sign-off</a:t>
             </a:r>
           </a:p>
           <a:p>
             <a:r>
               <a:rPr lang="en-GB" sz="2800" dirty="0"/>
-              <a:t>Students might not get seen. They might start to fall behind.</a:t>
+              <a:t>You need to know what the requirements are</a:t>
             </a:r>
           </a:p>
           <a:p>
             <a:r>
               <a:rPr lang="en-GB" sz="2800" dirty="0"/>
-              <a:t>If you can’t come, </a:t>
-            </a:r>
-            <a:r>
-              <a:rPr lang="en-GB" sz="2800" b="1" u="sng" dirty="0">
-                <a:solidFill>
-                  <a:srgbClr val="CC0000"/>
-                </a:solidFill>
-              </a:rPr>
-              <a:t>tell us in good time.</a:t>
-            </a:r>
-            <a:endParaRPr lang="en-GB" sz="2800" u="sng" dirty="0">
-              <a:solidFill>
-                <a:srgbClr val="CC0000"/>
-              </a:solidFill>
-            </a:endParaRPr>
+              <a:t>Feedback any issues to module coordinator</a:t>
+            </a:r>
+          </a:p>
+          <a:p>
+            <a:endParaRPr lang="en-GB" sz="2800" dirty="0"/>
           </a:p>
         </p:txBody>
       </p:sp>
     </p:spTree>
     <p:extLst>
       <p:ext uri="{BB962C8B-B14F-4D97-AF65-F5344CB8AC3E}">
-        <p14:creationId xmlns:p14="http://schemas.microsoft.com/office/powerpoint/2010/main" val="550045699"/>
+        <p14:creationId xmlns:p14="http://schemas.microsoft.com/office/powerpoint/2010/main" val="4244559619"/>
       </p:ext>
     </p:extLst>
   </p:cSld>
@@ -7534,6 +7677,131 @@
           <a:lstStyle/>
           <a:p>
             <a:br>
+              <a:rPr lang="en-GB" u="sng" dirty="0"/>
+            </a:br>
+            <a:br>
+              <a:rPr lang="en-GB" u="sng" dirty="0"/>
+            </a:br>
+            <a:r>
+              <a:rPr lang="en-GB" b="1" u="sng" dirty="0"/>
+              <a:t>Please turn up.</a:t>
+            </a:r>
+          </a:p>
+        </p:txBody>
+      </p:sp>
+      <p:sp>
+        <p:nvSpPr>
+          <p:cNvPr id="3" name="Content Placeholder 2"/>
+          <p:cNvSpPr>
+            <a:spLocks noGrp="1"/>
+          </p:cNvSpPr>
+          <p:nvPr>
+            <p:ph idx="1"/>
+          </p:nvPr>
+        </p:nvSpPr>
+        <p:spPr>
+          <a:xfrm>
+            <a:off x="457200" y="1772816"/>
+            <a:ext cx="8229600" cy="4353347"/>
+          </a:xfrm>
+        </p:spPr>
+        <p:txBody>
+          <a:bodyPr>
+            <a:normAutofit/>
+          </a:bodyPr>
+          <a:lstStyle/>
+          <a:p>
+            <a:r>
+              <a:rPr lang="en-GB" sz="2800" dirty="0"/>
+              <a:t>If you don’t come to a session you’re supposed to attend, it puts an unfair load on the other demonstrators and the lecturer.</a:t>
+            </a:r>
+          </a:p>
+          <a:p>
+            <a:r>
+              <a:rPr lang="en-GB" sz="2800" dirty="0"/>
+              <a:t>Students might not get seen. They might start to fall behind.</a:t>
+            </a:r>
+          </a:p>
+          <a:p>
+            <a:r>
+              <a:rPr lang="en-GB" sz="2800" dirty="0"/>
+              <a:t>If you can’t come, </a:t>
+            </a:r>
+            <a:r>
+              <a:rPr lang="en-GB" sz="2800" b="1" u="sng" dirty="0">
+                <a:solidFill>
+                  <a:srgbClr val="CC0000"/>
+                </a:solidFill>
+              </a:rPr>
+              <a:t>tell us in good time.</a:t>
+            </a:r>
+            <a:endParaRPr lang="en-GB" sz="2800" u="sng" dirty="0">
+              <a:solidFill>
+                <a:srgbClr val="CC0000"/>
+              </a:solidFill>
+            </a:endParaRPr>
+          </a:p>
+        </p:txBody>
+      </p:sp>
+    </p:spTree>
+    <p:extLst>
+      <p:ext uri="{BB962C8B-B14F-4D97-AF65-F5344CB8AC3E}">
+        <p14:creationId xmlns:p14="http://schemas.microsoft.com/office/powerpoint/2010/main" val="550045699"/>
+      </p:ext>
+    </p:extLst>
+  </p:cSld>
+  <p:clrMapOvr>
+    <a:masterClrMapping/>
+  </p:clrMapOvr>
+</p:sld>
+</file>
+
+<file path=ppt/slides/slide36.xml><?xml version="1.0" encoding="utf-8"?>
+<p:sld xmlns:a="http://schemas.openxmlformats.org/drawingml/2006/main" xmlns:r="http://schemas.openxmlformats.org/officeDocument/2006/relationships" xmlns:p="http://schemas.openxmlformats.org/presentationml/2006/main">
+  <p:cSld>
+    <p:bg>
+      <p:bgPr>
+        <a:blipFill rotWithShape="1">
+          <a:blip r:embed="rId2"/>
+          <a:stretch>
+            <a:fillRect/>
+          </a:stretch>
+        </a:blipFill>
+        <a:effectLst/>
+      </p:bgPr>
+    </p:bg>
+    <p:spTree>
+      <p:nvGrpSpPr>
+        <p:cNvPr id="1" name=""/>
+        <p:cNvGrpSpPr/>
+        <p:nvPr/>
+      </p:nvGrpSpPr>
+      <p:grpSpPr>
+        <a:xfrm>
+          <a:off x="0" y="0"/>
+          <a:ext cx="0" cy="0"/>
+          <a:chOff x="0" y="0"/>
+          <a:chExt cx="0" cy="0"/>
+        </a:xfrm>
+      </p:grpSpPr>
+      <p:sp>
+        <p:nvSpPr>
+          <p:cNvPr id="2" name="Title 1"/>
+          <p:cNvSpPr>
+            <a:spLocks noGrp="1"/>
+          </p:cNvSpPr>
+          <p:nvPr>
+            <p:ph type="title"/>
+          </p:nvPr>
+        </p:nvSpPr>
+        <p:spPr/>
+        <p:txBody>
+          <a:bodyPr>
+            <a:normAutofit fontScale="90000"/>
+          </a:bodyPr>
+          <a:lstStyle/>
+          <a:p>
+            <a:br>
               <a:rPr lang="en-GB" dirty="0"/>
             </a:br>
             <a:br>
@@ -7613,7 +7881,7 @@
 </p:sld>
 </file>
 
-<file path=ppt/slides/slide36.xml><?xml version="1.0" encoding="utf-8"?>
+<file path=ppt/slides/slide37.xml><?xml version="1.0" encoding="utf-8"?>
 <p:sld xmlns:a="http://schemas.openxmlformats.org/drawingml/2006/main" xmlns:r="http://schemas.openxmlformats.org/officeDocument/2006/relationships" xmlns:p="http://schemas.openxmlformats.org/presentationml/2006/main">
   <p:cSld>
     <p:bg>
@@ -8696,7 +8964,7 @@
 
 <file path=ppt/tags/tag1.xml><?xml version="1.0" encoding="utf-8"?>
 <p:tagLst xmlns:a="http://schemas.openxmlformats.org/drawingml/2006/main" xmlns:r="http://schemas.openxmlformats.org/officeDocument/2006/relationships" xmlns:p="http://schemas.openxmlformats.org/presentationml/2006/main">
-  <p:tag name="PRESGUID" val="48099f3e-cae3-4f6c-b4a4-19d34d79f1fd"/>
+  <p:tag name="PRESGUID" val="5b11d73b-542f-4fe2-9140-cdbf2d95bccf"/>
 </p:tagLst>
 </file>
 
@@ -9334,21 +9602,6 @@
 </file>
 
 <file path=customXml/item1.xml><?xml version="1.0" encoding="utf-8"?>
-<?mso-contentType ?>
-<FormTemplates xmlns="http://schemas.microsoft.com/sharepoint/v3/contenttype/forms">
-  <Display>DocumentLibraryForm</Display>
-  <Edit>DocumentLibraryForm</Edit>
-  <New>DocumentLibraryForm</New>
-</FormTemplates>
-</file>
-
-<file path=customXml/item2.xml><?xml version="1.0" encoding="utf-8"?>
-<p:properties xmlns:p="http://schemas.microsoft.com/office/2006/metadata/properties" xmlns:xsi="http://www.w3.org/2001/XMLSchema-instance" xmlns:pc="http://schemas.microsoft.com/office/infopath/2007/PartnerControls">
-  <documentManagement/>
-</p:properties>
-</file>
-
-<file path=customXml/item3.xml><?xml version="1.0" encoding="utf-8"?>
 <ct:contentTypeSchema xmlns:ct="http://schemas.microsoft.com/office/2006/metadata/contentType" xmlns:ma="http://schemas.microsoft.com/office/2006/metadata/properties/metaAttributes" ct:_="" ma:_="" ma:contentTypeName="Document" ma:contentTypeID="0x0101000022C0F3E70E2843B4EBC25B06EAA660" ma:contentTypeVersion="2" ma:contentTypeDescription="Create a new document." ma:contentTypeScope="" ma:versionID="516b2a4a130b5d5d7b3627b0830cafc9">
   <xsd:schema xmlns:xsd="http://www.w3.org/2001/XMLSchema" xmlns:xs="http://www.w3.org/2001/XMLSchema" xmlns:p="http://schemas.microsoft.com/office/2006/metadata/properties" xmlns:ns2="c4c4e6c1-1580-457f-8034-c126c8dee3c7" targetNamespace="http://schemas.microsoft.com/office/2006/metadata/properties" ma:root="true" ma:fieldsID="2968804d95356638d73bef96bc18660e" ns2:_="">
     <xsd:import namespace="c4c4e6c1-1580-457f-8034-c126c8dee3c7"/>
@@ -9496,31 +9749,22 @@
 </ct:contentTypeSchema>
 </file>
 
-<file path=customXml/itemProps1.xml><?xml version="1.0" encoding="utf-8"?>
-<ds:datastoreItem xmlns:ds="http://schemas.openxmlformats.org/officeDocument/2006/customXml" ds:itemID="{69EF6A2B-60F5-4035-9B8C-83BC032F5DF5}">
-  <ds:schemaRefs>
-    <ds:schemaRef ds:uri="http://schemas.microsoft.com/sharepoint/v3/contenttype/forms"/>
-  </ds:schemaRefs>
-</ds:datastoreItem>
+<file path=customXml/item2.xml><?xml version="1.0" encoding="utf-8"?>
+<?mso-contentType ?>
+<FormTemplates xmlns="http://schemas.microsoft.com/sharepoint/v3/contenttype/forms">
+  <Display>DocumentLibraryForm</Display>
+  <Edit>DocumentLibraryForm</Edit>
+  <New>DocumentLibraryForm</New>
+</FormTemplates>
 </file>
 
-<file path=customXml/itemProps2.xml><?xml version="1.0" encoding="utf-8"?>
-<ds:datastoreItem xmlns:ds="http://schemas.openxmlformats.org/officeDocument/2006/customXml" ds:itemID="{B182822E-3179-497E-8964-1C0779B53339}">
-  <ds:schemaRefs>
-    <ds:schemaRef ds:uri="c4c4e6c1-1580-457f-8034-c126c8dee3c7"/>
-    <ds:schemaRef ds:uri="http://schemas.microsoft.com/office/2006/documentManagement/types"/>
-    <ds:schemaRef ds:uri="http://schemas.microsoft.com/office/infopath/2007/PartnerControls"/>
-    <ds:schemaRef ds:uri="http://purl.org/dc/elements/1.1/"/>
-    <ds:schemaRef ds:uri="http://www.w3.org/XML/1998/namespace"/>
-    <ds:schemaRef ds:uri="http://schemas.microsoft.com/office/2006/metadata/properties"/>
-    <ds:schemaRef ds:uri="http://purl.org/dc/terms/"/>
-    <ds:schemaRef ds:uri="http://schemas.openxmlformats.org/package/2006/metadata/core-properties"/>
-    <ds:schemaRef ds:uri="http://purl.org/dc/dcmitype/"/>
-  </ds:schemaRefs>
-</ds:datastoreItem>
+<file path=customXml/item3.xml><?xml version="1.0" encoding="utf-8"?>
+<p:properties xmlns:p="http://schemas.microsoft.com/office/2006/metadata/properties" xmlns:xsi="http://www.w3.org/2001/XMLSchema-instance" xmlns:pc="http://schemas.microsoft.com/office/infopath/2007/PartnerControls">
+  <documentManagement/>
+</p:properties>
 </file>
 
-<file path=customXml/itemProps3.xml><?xml version="1.0" encoding="utf-8"?>
+<file path=customXml/itemProps1.xml><?xml version="1.0" encoding="utf-8"?>
 <ds:datastoreItem xmlns:ds="http://schemas.openxmlformats.org/officeDocument/2006/customXml" ds:itemID="{4FB6B691-6050-4BE3-B605-137196AFE281}">
   <ds:schemaRefs>
     <ds:schemaRef ds:uri="http://schemas.microsoft.com/office/2006/metadata/contentType"/>
@@ -9536,4 +9780,28 @@
     <ds:schemaRef ds:uri="http://schemas.microsoft.com/internal/obd"/>
   </ds:schemaRefs>
 </ds:datastoreItem>
+</file>
+
+<file path=customXml/itemProps2.xml><?xml version="1.0" encoding="utf-8"?>
+<ds:datastoreItem xmlns:ds="http://schemas.openxmlformats.org/officeDocument/2006/customXml" ds:itemID="{69EF6A2B-60F5-4035-9B8C-83BC032F5DF5}">
+  <ds:schemaRefs>
+    <ds:schemaRef ds:uri="http://schemas.microsoft.com/sharepoint/v3/contenttype/forms"/>
+  </ds:schemaRefs>
+</ds:datastoreItem>
+</file>
+
+<file path=customXml/itemProps3.xml><?xml version="1.0" encoding="utf-8"?>
+<ds:datastoreItem xmlns:ds="http://schemas.openxmlformats.org/officeDocument/2006/customXml" ds:itemID="{B182822E-3179-497E-8964-1C0779B53339}">
+  <ds:schemaRefs>
+    <ds:schemaRef ds:uri="c4c4e6c1-1580-457f-8034-c126c8dee3c7"/>
+    <ds:schemaRef ds:uri="http://schemas.microsoft.com/office/2006/documentManagement/types"/>
+    <ds:schemaRef ds:uri="http://schemas.microsoft.com/office/infopath/2007/PartnerControls"/>
+    <ds:schemaRef ds:uri="http://purl.org/dc/elements/1.1/"/>
+    <ds:schemaRef ds:uri="http://www.w3.org/XML/1998/namespace"/>
+    <ds:schemaRef ds:uri="http://schemas.microsoft.com/office/2006/metadata/properties"/>
+    <ds:schemaRef ds:uri="http://purl.org/dc/terms/"/>
+    <ds:schemaRef ds:uri="http://schemas.openxmlformats.org/package/2006/metadata/core-properties"/>
+    <ds:schemaRef ds:uri="http://purl.org/dc/dcmitype/"/>
+  </ds:schemaRefs>
+</ds:datastoreItem>
 </file>
</xml_diff>